<commit_message>
added Transactor class to DB design
</commit_message>
<xml_diff>
--- a/TV5 Documents/Database Design.pptx
+++ b/TV5 Documents/Database Design.pptx
@@ -104,6 +104,11 @@
       </a:defRPr>
     </a:lvl9pPr>
   </p:defaultTextStyle>
+  <p:extLst>
+    <p:ext uri="{EFAFB233-063F-42B5-8137-9DF3F51BA10A}">
+      <p15:sldGuideLst xmlns:p15="http://schemas.microsoft.com/office/powerpoint/2012/main"/>
+    </p:ext>
+  </p:extLst>
 </p:presentation>
 </file>
 
@@ -938,9 +943,9 @@
         <a:p>
           <a:r>
             <a:rPr lang="en-US" dirty="0" smtClean="0"/>
-            <a:t>type</a:t>
+            <a:t>Type</a:t>
           </a:r>
-          <a:endParaRPr lang="en-US" dirty="0"/>
+          <a:endParaRPr lang="en-US" dirty="0" smtClean="0"/>
         </a:p>
       </dgm:t>
     </dgm:pt>
@@ -1002,12 +1007,7 @@
             <a:rPr lang="en-US" dirty="0" smtClean="0"/>
             <a:t>Amount</a:t>
           </a:r>
-        </a:p>
-        <a:p>
-          <a:r>
-            <a:rPr lang="en-US" dirty="0" smtClean="0"/>
-            <a:t>type</a:t>
-          </a:r>
+          <a:endParaRPr lang="en-US" dirty="0" smtClean="0"/>
         </a:p>
       </dgm:t>
     </dgm:pt>
@@ -1033,6 +1033,72 @@
         </a:p>
       </dgm:t>
     </dgm:pt>
+    <dgm:pt modelId="{5D812574-A608-41AF-ACF6-187FB40929E8}">
+      <dgm:prSet phldrT="[Text]"/>
+      <dgm:spPr/>
+      <dgm:t>
+        <a:bodyPr/>
+        <a:lstStyle/>
+        <a:p>
+          <a:r>
+            <a:rPr lang="en-US" dirty="0" smtClean="0"/>
+            <a:t>TRANSACTOR</a:t>
+          </a:r>
+        </a:p>
+        <a:p>
+          <a:r>
+            <a:rPr lang="en-US" dirty="0" smtClean="0"/>
+            <a:t>Id</a:t>
+          </a:r>
+        </a:p>
+        <a:p>
+          <a:r>
+            <a:rPr lang="en-US" dirty="0" smtClean="0"/>
+            <a:t>Name</a:t>
+          </a:r>
+        </a:p>
+        <a:p>
+          <a:r>
+            <a:rPr lang="en-US" dirty="0" smtClean="0"/>
+            <a:t>Address</a:t>
+          </a:r>
+        </a:p>
+        <a:p>
+          <a:r>
+            <a:rPr lang="en-US" dirty="0" smtClean="0"/>
+            <a:t>Contact</a:t>
+          </a:r>
+        </a:p>
+        <a:p>
+          <a:r>
+            <a:rPr lang="en-US" dirty="0" smtClean="0"/>
+            <a:t>Terms</a:t>
+          </a:r>
+        </a:p>
+      </dgm:t>
+    </dgm:pt>
+    <dgm:pt modelId="{550CFEC4-056F-4906-A899-41AEE10B5F84}" type="parTrans" cxnId="{C2900931-C433-495F-BB08-A518EFAC1C29}">
+      <dgm:prSet/>
+      <dgm:spPr/>
+      <dgm:t>
+        <a:bodyPr/>
+        <a:lstStyle/>
+        <a:p>
+          <a:endParaRPr lang="en-US"/>
+        </a:p>
+      </dgm:t>
+    </dgm:pt>
+    <dgm:pt modelId="{29F35757-BFA4-4168-9474-D1A2D2A01BEE}" type="sibTrans" cxnId="{C2900931-C433-495F-BB08-A518EFAC1C29}">
+      <dgm:prSet/>
+      <dgm:spPr/>
+      <dgm:t>
+        <a:bodyPr/>
+        <a:lstStyle/>
+        <a:p>
+          <a:endParaRPr lang="en-US"/>
+        </a:p>
+      </dgm:t>
+    </dgm:pt>
     <dgm:pt modelId="{839B53E8-1EB7-4186-9CCA-B051B4381E5B}" type="pres">
       <dgm:prSet presAssocID="{2A435F72-4A71-4C4E-80D1-F2D1A7A3E811}" presName="hierChild1" presStyleCnt="0">
         <dgm:presLayoutVars>
@@ -1045,6 +1111,13 @@
         </dgm:presLayoutVars>
       </dgm:prSet>
       <dgm:spPr/>
+      <dgm:t>
+        <a:bodyPr/>
+        <a:lstStyle/>
+        <a:p>
+          <a:endParaRPr lang="en-US"/>
+        </a:p>
+      </dgm:t>
     </dgm:pt>
     <dgm:pt modelId="{F25EA383-E7EB-4AF8-A0B9-601CB3B26BD9}" type="pres">
       <dgm:prSet presAssocID="{E2A92887-A672-4E6D-8651-2CB9341CAF0B}" presName="hierRoot1" presStyleCnt="0">
@@ -1065,18 +1138,39 @@
         </dgm:presLayoutVars>
       </dgm:prSet>
       <dgm:spPr/>
+      <dgm:t>
+        <a:bodyPr/>
+        <a:lstStyle/>
+        <a:p>
+          <a:endParaRPr lang="en-US"/>
+        </a:p>
+      </dgm:t>
     </dgm:pt>
     <dgm:pt modelId="{CFB9A543-E78E-44CE-A6A4-A90DCF165B85}" type="pres">
       <dgm:prSet presAssocID="{E2A92887-A672-4E6D-8651-2CB9341CAF0B}" presName="rootConnector1" presStyleLbl="node1" presStyleIdx="0" presStyleCnt="0"/>
       <dgm:spPr/>
+      <dgm:t>
+        <a:bodyPr/>
+        <a:lstStyle/>
+        <a:p>
+          <a:endParaRPr lang="en-US"/>
+        </a:p>
+      </dgm:t>
     </dgm:pt>
     <dgm:pt modelId="{DE61B12E-86AF-4E71-A586-26F4BC22E7D9}" type="pres">
       <dgm:prSet presAssocID="{E2A92887-A672-4E6D-8651-2CB9341CAF0B}" presName="hierChild2" presStyleCnt="0"/>
       <dgm:spPr/>
     </dgm:pt>
     <dgm:pt modelId="{2788EE1B-B7B5-4309-A8E4-2C34F3A478A8}" type="pres">
-      <dgm:prSet presAssocID="{8648D618-0BBF-4046-AC48-281B4ED8E7B2}" presName="Name37" presStyleLbl="parChTrans1D2" presStyleIdx="0" presStyleCnt="2"/>
+      <dgm:prSet presAssocID="{8648D618-0BBF-4046-AC48-281B4ED8E7B2}" presName="Name37" presStyleLbl="parChTrans1D2" presStyleIdx="0" presStyleCnt="3"/>
       <dgm:spPr/>
+      <dgm:t>
+        <a:bodyPr/>
+        <a:lstStyle/>
+        <a:p>
+          <a:endParaRPr lang="en-US"/>
+        </a:p>
+      </dgm:t>
     </dgm:pt>
     <dgm:pt modelId="{C11A01B9-6484-47DA-9BE2-54256E680CAC}" type="pres">
       <dgm:prSet presAssocID="{3E4D2293-DFF4-45AC-8401-79606217904F}" presName="hierRoot2" presStyleCnt="0">
@@ -1091,7 +1185,7 @@
       <dgm:spPr/>
     </dgm:pt>
     <dgm:pt modelId="{6BA5266E-E703-41BB-884E-5DA0E682DFF2}" type="pres">
-      <dgm:prSet presAssocID="{3E4D2293-DFF4-45AC-8401-79606217904F}" presName="rootText" presStyleLbl="node2" presStyleIdx="0" presStyleCnt="2" custScaleY="250110">
+      <dgm:prSet presAssocID="{3E4D2293-DFF4-45AC-8401-79606217904F}" presName="rootText" presStyleLbl="node2" presStyleIdx="0" presStyleCnt="3" custScaleY="250110">
         <dgm:presLayoutVars>
           <dgm:chPref val="3"/>
         </dgm:presLayoutVars>
@@ -1106,8 +1200,15 @@
       </dgm:t>
     </dgm:pt>
     <dgm:pt modelId="{69F2C21C-B810-43FB-B5CD-D32327ACA5FF}" type="pres">
-      <dgm:prSet presAssocID="{3E4D2293-DFF4-45AC-8401-79606217904F}" presName="rootConnector" presStyleLbl="node2" presStyleIdx="0" presStyleCnt="2"/>
+      <dgm:prSet presAssocID="{3E4D2293-DFF4-45AC-8401-79606217904F}" presName="rootConnector" presStyleLbl="node2" presStyleIdx="0" presStyleCnt="3"/>
       <dgm:spPr/>
+      <dgm:t>
+        <a:bodyPr/>
+        <a:lstStyle/>
+        <a:p>
+          <a:endParaRPr lang="en-US"/>
+        </a:p>
+      </dgm:t>
     </dgm:pt>
     <dgm:pt modelId="{98BAF7C6-F024-49D6-85F4-0F07DE38BF95}" type="pres">
       <dgm:prSet presAssocID="{3E4D2293-DFF4-45AC-8401-79606217904F}" presName="hierChild4" presStyleCnt="0"/>
@@ -1118,8 +1219,15 @@
       <dgm:spPr/>
     </dgm:pt>
     <dgm:pt modelId="{41DF7830-6212-4FDF-9C4A-7BC07A340CB9}" type="pres">
-      <dgm:prSet presAssocID="{735760E6-3470-4300-ADF1-08A0AED09C04}" presName="Name37" presStyleLbl="parChTrans1D2" presStyleIdx="1" presStyleCnt="2"/>
+      <dgm:prSet presAssocID="{735760E6-3470-4300-ADF1-08A0AED09C04}" presName="Name37" presStyleLbl="parChTrans1D2" presStyleIdx="1" presStyleCnt="3"/>
       <dgm:spPr/>
+      <dgm:t>
+        <a:bodyPr/>
+        <a:lstStyle/>
+        <a:p>
+          <a:endParaRPr lang="en-US"/>
+        </a:p>
+      </dgm:t>
     </dgm:pt>
     <dgm:pt modelId="{33BE74A5-0225-4F39-B701-064A54C116A6}" type="pres">
       <dgm:prSet presAssocID="{CFF9B51C-9053-4E9F-B6CC-310848D0831B}" presName="hierRoot2" presStyleCnt="0">
@@ -1134,7 +1242,7 @@
       <dgm:spPr/>
     </dgm:pt>
     <dgm:pt modelId="{DE4162F5-84B7-4163-BE88-51D88E4CCC3A}" type="pres">
-      <dgm:prSet presAssocID="{CFF9B51C-9053-4E9F-B6CC-310848D0831B}" presName="rootText" presStyleLbl="node2" presStyleIdx="1" presStyleCnt="2" custScaleY="256352">
+      <dgm:prSet presAssocID="{CFF9B51C-9053-4E9F-B6CC-310848D0831B}" presName="rootText" presStyleLbl="node2" presStyleIdx="1" presStyleCnt="3" custScaleY="256352">
         <dgm:presLayoutVars>
           <dgm:chPref val="3"/>
         </dgm:presLayoutVars>
@@ -1149,8 +1257,15 @@
       </dgm:t>
     </dgm:pt>
     <dgm:pt modelId="{9A143976-E2D7-400B-AC70-FEEFD145A457}" type="pres">
-      <dgm:prSet presAssocID="{CFF9B51C-9053-4E9F-B6CC-310848D0831B}" presName="rootConnector" presStyleLbl="node2" presStyleIdx="1" presStyleCnt="2"/>
+      <dgm:prSet presAssocID="{CFF9B51C-9053-4E9F-B6CC-310848D0831B}" presName="rootConnector" presStyleLbl="node2" presStyleIdx="1" presStyleCnt="3"/>
       <dgm:spPr/>
+      <dgm:t>
+        <a:bodyPr/>
+        <a:lstStyle/>
+        <a:p>
+          <a:endParaRPr lang="en-US"/>
+        </a:p>
+      </dgm:t>
     </dgm:pt>
     <dgm:pt modelId="{75CEF97B-57D4-4FB4-8A4C-55ECB4F34163}" type="pres">
       <dgm:prSet presAssocID="{CFF9B51C-9053-4E9F-B6CC-310848D0831B}" presName="hierChild4" presStyleCnt="0"/>
@@ -1160,24 +1275,78 @@
       <dgm:prSet presAssocID="{CFF9B51C-9053-4E9F-B6CC-310848D0831B}" presName="hierChild5" presStyleCnt="0"/>
       <dgm:spPr/>
     </dgm:pt>
+    <dgm:pt modelId="{E4E7F68B-F7BE-48F8-B501-2C2192C41253}" type="pres">
+      <dgm:prSet presAssocID="{550CFEC4-056F-4906-A899-41AEE10B5F84}" presName="Name37" presStyleLbl="parChTrans1D2" presStyleIdx="2" presStyleCnt="3"/>
+      <dgm:spPr/>
+    </dgm:pt>
+    <dgm:pt modelId="{4A8E523E-9E69-472A-8625-59FB3C455686}" type="pres">
+      <dgm:prSet presAssocID="{5D812574-A608-41AF-ACF6-187FB40929E8}" presName="hierRoot2" presStyleCnt="0">
+        <dgm:presLayoutVars>
+          <dgm:hierBranch val="init"/>
+        </dgm:presLayoutVars>
+      </dgm:prSet>
+      <dgm:spPr/>
+    </dgm:pt>
+    <dgm:pt modelId="{923D1A39-5BB4-4C65-94C4-D31B8C0F9883}" type="pres">
+      <dgm:prSet presAssocID="{5D812574-A608-41AF-ACF6-187FB40929E8}" presName="rootComposite" presStyleCnt="0"/>
+      <dgm:spPr/>
+    </dgm:pt>
+    <dgm:pt modelId="{EE9B77B7-8CAF-4DD5-84D0-BF30A17822C7}" type="pres">
+      <dgm:prSet presAssocID="{5D812574-A608-41AF-ACF6-187FB40929E8}" presName="rootText" presStyleLbl="node2" presStyleIdx="2" presStyleCnt="3" custScaleY="254183" custLinFactNeighborX="15198" custLinFactNeighborY="1084">
+        <dgm:presLayoutVars>
+          <dgm:chPref val="3"/>
+        </dgm:presLayoutVars>
+      </dgm:prSet>
+      <dgm:spPr/>
+      <dgm:t>
+        <a:bodyPr/>
+        <a:lstStyle/>
+        <a:p>
+          <a:endParaRPr lang="en-US"/>
+        </a:p>
+      </dgm:t>
+    </dgm:pt>
+    <dgm:pt modelId="{343D6150-8A83-42FF-BA16-AFEC62A87F81}" type="pres">
+      <dgm:prSet presAssocID="{5D812574-A608-41AF-ACF6-187FB40929E8}" presName="rootConnector" presStyleLbl="node2" presStyleIdx="2" presStyleCnt="3"/>
+      <dgm:spPr/>
+      <dgm:t>
+        <a:bodyPr/>
+        <a:lstStyle/>
+        <a:p>
+          <a:endParaRPr lang="en-US"/>
+        </a:p>
+      </dgm:t>
+    </dgm:pt>
+    <dgm:pt modelId="{ACBF5610-2E62-4C39-9610-7A7FF1C632DE}" type="pres">
+      <dgm:prSet presAssocID="{5D812574-A608-41AF-ACF6-187FB40929E8}" presName="hierChild4" presStyleCnt="0"/>
+      <dgm:spPr/>
+    </dgm:pt>
+    <dgm:pt modelId="{B0D27638-7ECA-45F3-9A54-82277B2FC33D}" type="pres">
+      <dgm:prSet presAssocID="{5D812574-A608-41AF-ACF6-187FB40929E8}" presName="hierChild5" presStyleCnt="0"/>
+      <dgm:spPr/>
+    </dgm:pt>
     <dgm:pt modelId="{8C63DB35-0D86-462B-BC10-2EEED6CEBD12}" type="pres">
       <dgm:prSet presAssocID="{E2A92887-A672-4E6D-8651-2CB9341CAF0B}" presName="hierChild3" presStyleCnt="0"/>
       <dgm:spPr/>
     </dgm:pt>
   </dgm:ptLst>
   <dgm:cxnLst>
-    <dgm:cxn modelId="{DE3A3D18-C68F-4384-8430-77E21BE5F015}" type="presOf" srcId="{CFF9B51C-9053-4E9F-B6CC-310848D0831B}" destId="{DE4162F5-84B7-4163-BE88-51D88E4CCC3A}" srcOrd="0" destOrd="0" presId="urn:microsoft.com/office/officeart/2005/8/layout/orgChart1"/>
-    <dgm:cxn modelId="{A91FCA41-931F-4268-B1BD-258C6E68F374}" type="presOf" srcId="{CFF9B51C-9053-4E9F-B6CC-310848D0831B}" destId="{9A143976-E2D7-400B-AC70-FEEFD145A457}" srcOrd="1" destOrd="0" presId="urn:microsoft.com/office/officeart/2005/8/layout/orgChart1"/>
-    <dgm:cxn modelId="{E1B67E3D-0108-4444-9606-51368A9D8D1D}" type="presOf" srcId="{E2A92887-A672-4E6D-8651-2CB9341CAF0B}" destId="{CFB9A543-E78E-44CE-A6A4-A90DCF165B85}" srcOrd="1" destOrd="0" presId="urn:microsoft.com/office/officeart/2005/8/layout/orgChart1"/>
+    <dgm:cxn modelId="{C2900931-C433-495F-BB08-A518EFAC1C29}" srcId="{E2A92887-A672-4E6D-8651-2CB9341CAF0B}" destId="{5D812574-A608-41AF-ACF6-187FB40929E8}" srcOrd="2" destOrd="0" parTransId="{550CFEC4-056F-4906-A899-41AEE10B5F84}" sibTransId="{29F35757-BFA4-4168-9474-D1A2D2A01BEE}"/>
     <dgm:cxn modelId="{AFAEE589-98FE-48D3-8EB5-6246419F16BC}" srcId="{E2A92887-A672-4E6D-8651-2CB9341CAF0B}" destId="{CFF9B51C-9053-4E9F-B6CC-310848D0831B}" srcOrd="1" destOrd="0" parTransId="{735760E6-3470-4300-ADF1-08A0AED09C04}" sibTransId="{D34066D8-4AA2-4CB1-BDDB-EE15D9692E67}"/>
-    <dgm:cxn modelId="{27B6CBA0-6C12-4919-983B-2E8F38E9B626}" srcId="{2A435F72-4A71-4C4E-80D1-F2D1A7A3E811}" destId="{E2A92887-A672-4E6D-8651-2CB9341CAF0B}" srcOrd="0" destOrd="0" parTransId="{6369FC28-AA3E-4C1E-92A6-6022A33265F1}" sibTransId="{8E42ACC0-9BB8-4B3C-A295-9179F60FD18B}"/>
+    <dgm:cxn modelId="{F82EC2DD-22ED-49B0-A0DF-D7E9D6D28C2A}" type="presOf" srcId="{5D812574-A608-41AF-ACF6-187FB40929E8}" destId="{EE9B77B7-8CAF-4DD5-84D0-BF30A17822C7}" srcOrd="0" destOrd="0" presId="urn:microsoft.com/office/officeart/2005/8/layout/orgChart1"/>
+    <dgm:cxn modelId="{1E2A5ADC-2492-4336-9829-AE9D60BD2CBE}" type="presOf" srcId="{5D812574-A608-41AF-ACF6-187FB40929E8}" destId="{343D6150-8A83-42FF-BA16-AFEC62A87F81}" srcOrd="1" destOrd="0" presId="urn:microsoft.com/office/officeart/2005/8/layout/orgChart1"/>
+    <dgm:cxn modelId="{578C87CC-18A9-4E66-BDC7-07DF05B34EF3}" type="presOf" srcId="{735760E6-3470-4300-ADF1-08A0AED09C04}" destId="{41DF7830-6212-4FDF-9C4A-7BC07A340CB9}" srcOrd="0" destOrd="0" presId="urn:microsoft.com/office/officeart/2005/8/layout/orgChart1"/>
     <dgm:cxn modelId="{D1BCF0D8-5FE6-45C3-A654-57D81FC660A5}" type="presOf" srcId="{3E4D2293-DFF4-45AC-8401-79606217904F}" destId="{6BA5266E-E703-41BB-884E-5DA0E682DFF2}" srcOrd="0" destOrd="0" presId="urn:microsoft.com/office/officeart/2005/8/layout/orgChart1"/>
     <dgm:cxn modelId="{578C882B-990E-4B20-BF4A-5F0BFA9C0EF1}" type="presOf" srcId="{3E4D2293-DFF4-45AC-8401-79606217904F}" destId="{69F2C21C-B810-43FB-B5CD-D32327ACA5FF}" srcOrd="1" destOrd="0" presId="urn:microsoft.com/office/officeart/2005/8/layout/orgChart1"/>
+    <dgm:cxn modelId="{A91FCA41-931F-4268-B1BD-258C6E68F374}" type="presOf" srcId="{CFF9B51C-9053-4E9F-B6CC-310848D0831B}" destId="{9A143976-E2D7-400B-AC70-FEEFD145A457}" srcOrd="1" destOrd="0" presId="urn:microsoft.com/office/officeart/2005/8/layout/orgChart1"/>
     <dgm:cxn modelId="{3DF7DF0E-7057-430D-A6DC-095D0B59F07F}" type="presOf" srcId="{E2A92887-A672-4E6D-8651-2CB9341CAF0B}" destId="{19A041D5-A0A5-4B7C-B1A6-0D2A6404D85F}" srcOrd="0" destOrd="0" presId="urn:microsoft.com/office/officeart/2005/8/layout/orgChart1"/>
+    <dgm:cxn modelId="{E1B67E3D-0108-4444-9606-51368A9D8D1D}" type="presOf" srcId="{E2A92887-A672-4E6D-8651-2CB9341CAF0B}" destId="{CFB9A543-E78E-44CE-A6A4-A90DCF165B85}" srcOrd="1" destOrd="0" presId="urn:microsoft.com/office/officeart/2005/8/layout/orgChart1"/>
+    <dgm:cxn modelId="{3E9881AD-73FA-4F82-9A49-FB28308E90E3}" type="presOf" srcId="{550CFEC4-056F-4906-A899-41AEE10B5F84}" destId="{E4E7F68B-F7BE-48F8-B501-2C2192C41253}" srcOrd="0" destOrd="0" presId="urn:microsoft.com/office/officeart/2005/8/layout/orgChart1"/>
     <dgm:cxn modelId="{A799C299-1847-4061-9214-EDAF04757BF6}" srcId="{E2A92887-A672-4E6D-8651-2CB9341CAF0B}" destId="{3E4D2293-DFF4-45AC-8401-79606217904F}" srcOrd="0" destOrd="0" parTransId="{8648D618-0BBF-4046-AC48-281B4ED8E7B2}" sibTransId="{F8B3E8F9-79D6-40DC-9402-5B1585BBA6AA}"/>
     <dgm:cxn modelId="{69DA603F-F9A6-4153-8C11-CBF4BA1B4615}" type="presOf" srcId="{8648D618-0BBF-4046-AC48-281B4ED8E7B2}" destId="{2788EE1B-B7B5-4309-A8E4-2C34F3A478A8}" srcOrd="0" destOrd="0" presId="urn:microsoft.com/office/officeart/2005/8/layout/orgChart1"/>
+    <dgm:cxn modelId="{DE3A3D18-C68F-4384-8430-77E21BE5F015}" type="presOf" srcId="{CFF9B51C-9053-4E9F-B6CC-310848D0831B}" destId="{DE4162F5-84B7-4163-BE88-51D88E4CCC3A}" srcOrd="0" destOrd="0" presId="urn:microsoft.com/office/officeart/2005/8/layout/orgChart1"/>
+    <dgm:cxn modelId="{27B6CBA0-6C12-4919-983B-2E8F38E9B626}" srcId="{2A435F72-4A71-4C4E-80D1-F2D1A7A3E811}" destId="{E2A92887-A672-4E6D-8651-2CB9341CAF0B}" srcOrd="0" destOrd="0" parTransId="{6369FC28-AA3E-4C1E-92A6-6022A33265F1}" sibTransId="{8E42ACC0-9BB8-4B3C-A295-9179F60FD18B}"/>
     <dgm:cxn modelId="{50320B9F-B0A4-4701-9B66-80BE951E2602}" type="presOf" srcId="{2A435F72-4A71-4C4E-80D1-F2D1A7A3E811}" destId="{839B53E8-1EB7-4186-9CCA-B051B4381E5B}" srcOrd="0" destOrd="0" presId="urn:microsoft.com/office/officeart/2005/8/layout/orgChart1"/>
-    <dgm:cxn modelId="{578C87CC-18A9-4E66-BDC7-07DF05B34EF3}" type="presOf" srcId="{735760E6-3470-4300-ADF1-08A0AED09C04}" destId="{41DF7830-6212-4FDF-9C4A-7BC07A340CB9}" srcOrd="0" destOrd="0" presId="urn:microsoft.com/office/officeart/2005/8/layout/orgChart1"/>
     <dgm:cxn modelId="{B241CD0E-A291-4909-800B-F8950D8472A3}" type="presParOf" srcId="{839B53E8-1EB7-4186-9CCA-B051B4381E5B}" destId="{F25EA383-E7EB-4AF8-A0B9-601CB3B26BD9}" srcOrd="0" destOrd="0" presId="urn:microsoft.com/office/officeart/2005/8/layout/orgChart1"/>
     <dgm:cxn modelId="{ED29952C-211F-4CA0-AE6C-0C84AA02D97E}" type="presParOf" srcId="{F25EA383-E7EB-4AF8-A0B9-601CB3B26BD9}" destId="{0DFC4767-F12F-403F-BB3B-D7E7157C2B37}" srcOrd="0" destOrd="0" presId="urn:microsoft.com/office/officeart/2005/8/layout/orgChart1"/>
     <dgm:cxn modelId="{4A32362E-5E61-4529-A71D-402762913E4E}" type="presParOf" srcId="{0DFC4767-F12F-403F-BB3B-D7E7157C2B37}" destId="{19A041D5-A0A5-4B7C-B1A6-0D2A6404D85F}" srcOrd="0" destOrd="0" presId="urn:microsoft.com/office/officeart/2005/8/layout/orgChart1"/>
@@ -1197,6 +1366,13 @@
     <dgm:cxn modelId="{9CA3F43E-2BC2-4BAE-B9F8-50E833093043}" type="presParOf" srcId="{C5032937-FF69-43EF-85A7-58E8E5B8574F}" destId="{9A143976-E2D7-400B-AC70-FEEFD145A457}" srcOrd="1" destOrd="0" presId="urn:microsoft.com/office/officeart/2005/8/layout/orgChart1"/>
     <dgm:cxn modelId="{0A3C7B8D-6769-433B-BBBF-11D3B935571D}" type="presParOf" srcId="{33BE74A5-0225-4F39-B701-064A54C116A6}" destId="{75CEF97B-57D4-4FB4-8A4C-55ECB4F34163}" srcOrd="1" destOrd="0" presId="urn:microsoft.com/office/officeart/2005/8/layout/orgChart1"/>
     <dgm:cxn modelId="{A16BF021-846D-4A7A-B8F7-21A0C925309A}" type="presParOf" srcId="{33BE74A5-0225-4F39-B701-064A54C116A6}" destId="{FCA06BDA-3EE6-4FD9-A157-0010EC34BB5D}" srcOrd="2" destOrd="0" presId="urn:microsoft.com/office/officeart/2005/8/layout/orgChart1"/>
+    <dgm:cxn modelId="{642DDF8C-8488-4DEB-BE27-BFFA7AB55A5B}" type="presParOf" srcId="{DE61B12E-86AF-4E71-A586-26F4BC22E7D9}" destId="{E4E7F68B-F7BE-48F8-B501-2C2192C41253}" srcOrd="4" destOrd="0" presId="urn:microsoft.com/office/officeart/2005/8/layout/orgChart1"/>
+    <dgm:cxn modelId="{A06DF088-D249-4845-B09E-736726F6A698}" type="presParOf" srcId="{DE61B12E-86AF-4E71-A586-26F4BC22E7D9}" destId="{4A8E523E-9E69-472A-8625-59FB3C455686}" srcOrd="5" destOrd="0" presId="urn:microsoft.com/office/officeart/2005/8/layout/orgChart1"/>
+    <dgm:cxn modelId="{AD743509-2AF6-41D1-8B09-CC5B4F1AF208}" type="presParOf" srcId="{4A8E523E-9E69-472A-8625-59FB3C455686}" destId="{923D1A39-5BB4-4C65-94C4-D31B8C0F9883}" srcOrd="0" destOrd="0" presId="urn:microsoft.com/office/officeart/2005/8/layout/orgChart1"/>
+    <dgm:cxn modelId="{B387F31E-3EF0-455C-89EA-3E9F07831792}" type="presParOf" srcId="{923D1A39-5BB4-4C65-94C4-D31B8C0F9883}" destId="{EE9B77B7-8CAF-4DD5-84D0-BF30A17822C7}" srcOrd="0" destOrd="0" presId="urn:microsoft.com/office/officeart/2005/8/layout/orgChart1"/>
+    <dgm:cxn modelId="{CE1940C9-4A10-4088-9D21-E43D429319E1}" type="presParOf" srcId="{923D1A39-5BB4-4C65-94C4-D31B8C0F9883}" destId="{343D6150-8A83-42FF-BA16-AFEC62A87F81}" srcOrd="1" destOrd="0" presId="urn:microsoft.com/office/officeart/2005/8/layout/orgChart1"/>
+    <dgm:cxn modelId="{C9DEC535-64D7-479F-AFC5-B1A1C26B7226}" type="presParOf" srcId="{4A8E523E-9E69-472A-8625-59FB3C455686}" destId="{ACBF5610-2E62-4C39-9610-7A7FF1C632DE}" srcOrd="1" destOrd="0" presId="urn:microsoft.com/office/officeart/2005/8/layout/orgChart1"/>
+    <dgm:cxn modelId="{08C3849A-A252-4DEA-A10F-544674292EAF}" type="presParOf" srcId="{4A8E523E-9E69-472A-8625-59FB3C455686}" destId="{B0D27638-7ECA-45F3-9A54-82277B2FC33D}" srcOrd="2" destOrd="0" presId="urn:microsoft.com/office/officeart/2005/8/layout/orgChart1"/>
     <dgm:cxn modelId="{F8E7B62D-EC7E-4F69-8448-1007861E41EA}" type="presParOf" srcId="{F25EA383-E7EB-4AF8-A0B9-601CB3B26BD9}" destId="{8C63DB35-0D86-462B-BC10-2EEED6CEBD12}" srcOrd="2" destOrd="0" presId="urn:microsoft.com/office/officeart/2005/8/layout/orgChart1"/>
   </dgm:cxnLst>
   <dgm:bg/>
@@ -1217,15 +1393,15 @@
       <dsp:cNvGrpSpPr/>
     </dsp:nvGrpSpPr>
     <dsp:grpSpPr/>
-    <dsp:sp modelId="{41DF7830-6212-4FDF-9C4A-7BC07A340CB9}">
+    <dsp:sp modelId="{E4E7F68B-F7BE-48F8-B501-2C2192C41253}">
       <dsp:nvSpPr>
         <dsp:cNvPr id="0" name=""/>
         <dsp:cNvSpPr/>
       </dsp:nvSpPr>
       <dsp:spPr>
         <a:xfrm>
-          <a:off x="4064000" y="1361237"/>
-          <a:ext cx="1644749" cy="570904"/>
+          <a:off x="4064000" y="1530979"/>
+          <a:ext cx="2875855" cy="511900"/>
         </a:xfrm>
         <a:custGeom>
           <a:avLst/>
@@ -1239,13 +1415,69 @@
                 <a:pt x="0" y="0"/>
               </a:moveTo>
               <a:lnTo>
-                <a:pt x="0" y="285452"/>
+                <a:pt x="0" y="262389"/>
               </a:lnTo>
               <a:lnTo>
-                <a:pt x="1644749" y="285452"/>
+                <a:pt x="2875855" y="262389"/>
               </a:lnTo>
               <a:lnTo>
-                <a:pt x="1644749" y="570904"/>
+                <a:pt x="2875855" y="511900"/>
+              </a:lnTo>
+            </a:path>
+          </a:pathLst>
+        </a:custGeom>
+        <a:noFill/>
+        <a:ln w="12700" cap="flat" cmpd="sng" algn="ctr">
+          <a:solidFill>
+            <a:schemeClr val="accent1">
+              <a:shade val="60000"/>
+              <a:hueOff val="0"/>
+              <a:satOff val="0"/>
+              <a:lumOff val="0"/>
+              <a:alphaOff val="0"/>
+            </a:schemeClr>
+          </a:solidFill>
+          <a:prstDash val="solid"/>
+          <a:miter lim="800000"/>
+        </a:ln>
+        <a:effectLst/>
+      </dsp:spPr>
+      <dsp:style>
+        <a:lnRef idx="2">
+          <a:scrgbClr r="0" g="0" b="0"/>
+        </a:lnRef>
+        <a:fillRef idx="0">
+          <a:scrgbClr r="0" g="0" b="0"/>
+        </a:fillRef>
+        <a:effectRef idx="0">
+          <a:scrgbClr r="0" g="0" b="0"/>
+        </a:effectRef>
+        <a:fontRef idx="minor"/>
+      </dsp:style>
+    </dsp:sp>
+    <dsp:sp modelId="{41DF7830-6212-4FDF-9C4A-7BC07A340CB9}">
+      <dsp:nvSpPr>
+        <dsp:cNvPr id="0" name=""/>
+        <dsp:cNvSpPr/>
+      </dsp:nvSpPr>
+      <dsp:spPr>
+        <a:xfrm>
+          <a:off x="4018280" y="1530979"/>
+          <a:ext cx="91440" cy="499020"/>
+        </a:xfrm>
+        <a:custGeom>
+          <a:avLst/>
+          <a:gdLst/>
+          <a:ahLst/>
+          <a:cxnLst/>
+          <a:rect l="0" t="0" r="0" b="0"/>
+          <a:pathLst>
+            <a:path>
+              <a:moveTo>
+                <a:pt x="45720" y="0"/>
+              </a:moveTo>
+              <a:lnTo>
+                <a:pt x="45720" y="499020"/>
               </a:lnTo>
             </a:path>
           </a:pathLst>
@@ -1286,8 +1518,8 @@
       </dsp:nvSpPr>
       <dsp:spPr>
         <a:xfrm>
-          <a:off x="2419250" y="1361237"/>
-          <a:ext cx="1644749" cy="570904"/>
+          <a:off x="1188690" y="1530979"/>
+          <a:ext cx="2875309" cy="499020"/>
         </a:xfrm>
         <a:custGeom>
           <a:avLst/>
@@ -1298,16 +1530,16 @@
           <a:pathLst>
             <a:path>
               <a:moveTo>
-                <a:pt x="1644749" y="0"/>
+                <a:pt x="2875309" y="0"/>
               </a:moveTo>
               <a:lnTo>
-                <a:pt x="1644749" y="285452"/>
+                <a:pt x="2875309" y="249510"/>
               </a:lnTo>
               <a:lnTo>
-                <a:pt x="0" y="285452"/>
+                <a:pt x="0" y="249510"/>
               </a:lnTo>
               <a:lnTo>
-                <a:pt x="0" y="570904"/>
+                <a:pt x="0" y="499020"/>
               </a:lnTo>
             </a:path>
           </a:pathLst>
@@ -1348,8 +1580,8 @@
       </dsp:nvSpPr>
       <dsp:spPr>
         <a:xfrm>
-          <a:off x="2704703" y="1940"/>
-          <a:ext cx="2718593" cy="1359296"/>
+          <a:off x="2875855" y="342834"/>
+          <a:ext cx="2376289" cy="1188144"/>
         </a:xfrm>
         <a:prstGeom prst="rect">
           <a:avLst/>
@@ -1391,12 +1623,12 @@
         </a:fontRef>
       </dsp:style>
       <dsp:txBody>
-        <a:bodyPr spcFirstLastPara="0" vert="horz" wrap="square" lIns="19685" tIns="19685" rIns="19685" bIns="19685" numCol="1" spcCol="1270" anchor="ctr" anchorCtr="0">
+        <a:bodyPr spcFirstLastPara="0" vert="horz" wrap="square" lIns="16510" tIns="16510" rIns="16510" bIns="16510" numCol="1" spcCol="1270" anchor="ctr" anchorCtr="0">
           <a:noAutofit/>
         </a:bodyPr>
         <a:lstStyle/>
         <a:p>
-          <a:pPr lvl="0" algn="ctr" defTabSz="1377950">
+          <a:pPr lvl="0" algn="ctr" defTabSz="1155700">
             <a:lnSpc>
               <a:spcPct val="90000"/>
             </a:lnSpc>
@@ -1408,15 +1640,15 @@
             </a:spcAft>
           </a:pPr>
           <a:r>
-            <a:rPr lang="en-US" sz="3100" kern="1200" dirty="0" err="1" smtClean="0"/>
+            <a:rPr lang="en-US" sz="2600" kern="1200" dirty="0" err="1" smtClean="0"/>
             <a:t>Datastore</a:t>
           </a:r>
-          <a:endParaRPr lang="en-US" sz="3100" kern="1200" dirty="0"/>
+          <a:endParaRPr lang="en-US" sz="2600" kern="1200" dirty="0"/>
         </a:p>
       </dsp:txBody>
       <dsp:txXfrm>
-        <a:off x="2704703" y="1940"/>
-        <a:ext cx="2718593" cy="1359296"/>
+        <a:off x="2875855" y="342834"/>
+        <a:ext cx="2376289" cy="1188144"/>
       </dsp:txXfrm>
     </dsp:sp>
     <dsp:sp modelId="{6BA5266E-E703-41BB-884E-5DA0E682DFF2}">
@@ -1426,8 +1658,8 @@
       </dsp:nvSpPr>
       <dsp:spPr>
         <a:xfrm>
-          <a:off x="1059953" y="1932141"/>
-          <a:ext cx="2718593" cy="3399737"/>
+          <a:off x="545" y="2029999"/>
+          <a:ext cx="2376289" cy="2971668"/>
         </a:xfrm>
         <a:prstGeom prst="rect">
           <a:avLst/>
@@ -1469,12 +1701,12 @@
         </a:fontRef>
       </dsp:style>
       <dsp:txBody>
-        <a:bodyPr spcFirstLastPara="0" vert="horz" wrap="square" lIns="19685" tIns="19685" rIns="19685" bIns="19685" numCol="1" spcCol="1270" anchor="ctr" anchorCtr="0">
+        <a:bodyPr spcFirstLastPara="0" vert="horz" wrap="square" lIns="16510" tIns="16510" rIns="16510" bIns="16510" numCol="1" spcCol="1270" anchor="ctr" anchorCtr="0">
           <a:noAutofit/>
         </a:bodyPr>
         <a:lstStyle/>
         <a:p>
-          <a:pPr lvl="0" algn="ctr" defTabSz="1377950">
+          <a:pPr lvl="0" algn="ctr" defTabSz="1155700">
             <a:lnSpc>
               <a:spcPct val="90000"/>
             </a:lnSpc>
@@ -1486,12 +1718,12 @@
             </a:spcAft>
           </a:pPr>
           <a:r>
-            <a:rPr lang="en-US" sz="3100" kern="1200" dirty="0" smtClean="0"/>
+            <a:rPr lang="en-US" sz="2600" kern="1200" dirty="0" smtClean="0"/>
             <a:t>USER</a:t>
           </a:r>
         </a:p>
         <a:p>
-          <a:pPr lvl="0" algn="ctr" defTabSz="1377950">
+          <a:pPr lvl="0" algn="ctr" defTabSz="1155700">
             <a:lnSpc>
               <a:spcPct val="90000"/>
             </a:lnSpc>
@@ -1503,12 +1735,12 @@
             </a:spcAft>
           </a:pPr>
           <a:r>
-            <a:rPr lang="en-US" sz="3100" kern="1200" dirty="0" smtClean="0"/>
+            <a:rPr lang="en-US" sz="2600" kern="1200" dirty="0" smtClean="0"/>
             <a:t>Id</a:t>
           </a:r>
         </a:p>
         <a:p>
-          <a:pPr lvl="0" algn="ctr" defTabSz="1377950">
+          <a:pPr lvl="0" algn="ctr" defTabSz="1155700">
             <a:lnSpc>
               <a:spcPct val="90000"/>
             </a:lnSpc>
@@ -1520,12 +1752,12 @@
             </a:spcAft>
           </a:pPr>
           <a:r>
-            <a:rPr lang="en-US" sz="3100" kern="1200" dirty="0" smtClean="0"/>
+            <a:rPr lang="en-US" sz="2600" kern="1200" dirty="0" smtClean="0"/>
             <a:t>Name</a:t>
           </a:r>
         </a:p>
         <a:p>
-          <a:pPr lvl="0" algn="ctr" defTabSz="1377950">
+          <a:pPr lvl="0" algn="ctr" defTabSz="1155700">
             <a:lnSpc>
               <a:spcPct val="90000"/>
             </a:lnSpc>
@@ -1537,12 +1769,12 @@
             </a:spcAft>
           </a:pPr>
           <a:r>
-            <a:rPr lang="en-US" sz="3100" kern="1200" dirty="0" smtClean="0"/>
+            <a:rPr lang="en-US" sz="2600" kern="1200" dirty="0" smtClean="0"/>
             <a:t>Password</a:t>
           </a:r>
         </a:p>
         <a:p>
-          <a:pPr lvl="0" algn="ctr" defTabSz="1377950">
+          <a:pPr lvl="0" algn="ctr" defTabSz="1155700">
             <a:lnSpc>
               <a:spcPct val="90000"/>
             </a:lnSpc>
@@ -1554,15 +1786,15 @@
             </a:spcAft>
           </a:pPr>
           <a:r>
-            <a:rPr lang="en-US" sz="3100" kern="1200" dirty="0" smtClean="0"/>
-            <a:t>type</a:t>
+            <a:rPr lang="en-US" sz="2600" kern="1200" dirty="0" smtClean="0"/>
+            <a:t>Type</a:t>
           </a:r>
-          <a:endParaRPr lang="en-US" sz="3100" kern="1200" dirty="0"/>
+          <a:endParaRPr lang="en-US" sz="2600" kern="1200" dirty="0" smtClean="0"/>
         </a:p>
       </dsp:txBody>
       <dsp:txXfrm>
-        <a:off x="1059953" y="1932141"/>
-        <a:ext cx="2718593" cy="3399737"/>
+        <a:off x="545" y="2029999"/>
+        <a:ext cx="2376289" cy="2971668"/>
       </dsp:txXfrm>
     </dsp:sp>
     <dsp:sp modelId="{DE4162F5-84B7-4163-BE88-51D88E4CCC3A}">
@@ -1572,8 +1804,8 @@
       </dsp:nvSpPr>
       <dsp:spPr>
         <a:xfrm>
-          <a:off x="4349452" y="1932141"/>
-          <a:ext cx="2718593" cy="3484584"/>
+          <a:off x="2875855" y="2029999"/>
+          <a:ext cx="2376289" cy="3045832"/>
         </a:xfrm>
         <a:prstGeom prst="rect">
           <a:avLst/>
@@ -1615,12 +1847,12 @@
         </a:fontRef>
       </dsp:style>
       <dsp:txBody>
-        <a:bodyPr spcFirstLastPara="0" vert="horz" wrap="square" lIns="19685" tIns="19685" rIns="19685" bIns="19685" numCol="1" spcCol="1270" anchor="ctr" anchorCtr="0">
+        <a:bodyPr spcFirstLastPara="0" vert="horz" wrap="square" lIns="16510" tIns="16510" rIns="16510" bIns="16510" numCol="1" spcCol="1270" anchor="ctr" anchorCtr="0">
           <a:noAutofit/>
         </a:bodyPr>
         <a:lstStyle/>
         <a:p>
-          <a:pPr lvl="0" algn="ctr" defTabSz="1377950">
+          <a:pPr lvl="0" algn="ctr" defTabSz="1155700">
             <a:lnSpc>
               <a:spcPct val="90000"/>
             </a:lnSpc>
@@ -1632,12 +1864,12 @@
             </a:spcAft>
           </a:pPr>
           <a:r>
-            <a:rPr lang="en-US" sz="3100" kern="1200" dirty="0" smtClean="0"/>
+            <a:rPr lang="en-US" sz="2600" kern="1200" dirty="0" smtClean="0"/>
             <a:t>ACCOUNT</a:t>
           </a:r>
         </a:p>
         <a:p>
-          <a:pPr lvl="0" algn="ctr" defTabSz="1377950">
+          <a:pPr lvl="0" algn="ctr" defTabSz="1155700">
             <a:lnSpc>
               <a:spcPct val="90000"/>
             </a:lnSpc>
@@ -1649,12 +1881,12 @@
             </a:spcAft>
           </a:pPr>
           <a:r>
-            <a:rPr lang="en-US" sz="3100" kern="1200" dirty="0" smtClean="0"/>
+            <a:rPr lang="en-US" sz="2600" kern="1200" dirty="0" smtClean="0"/>
             <a:t>Id</a:t>
           </a:r>
         </a:p>
         <a:p>
-          <a:pPr lvl="0" algn="ctr" defTabSz="1377950">
+          <a:pPr lvl="0" algn="ctr" defTabSz="1155700">
             <a:lnSpc>
               <a:spcPct val="90000"/>
             </a:lnSpc>
@@ -1666,12 +1898,12 @@
             </a:spcAft>
           </a:pPr>
           <a:r>
-            <a:rPr lang="en-US" sz="3100" kern="1200" dirty="0" smtClean="0"/>
+            <a:rPr lang="en-US" sz="2600" kern="1200" dirty="0" smtClean="0"/>
             <a:t>Date</a:t>
           </a:r>
         </a:p>
         <a:p>
-          <a:pPr lvl="0" algn="ctr" defTabSz="1377950">
+          <a:pPr lvl="0" algn="ctr" defTabSz="1155700">
             <a:lnSpc>
               <a:spcPct val="90000"/>
             </a:lnSpc>
@@ -1683,13 +1915,13 @@
             </a:spcAft>
           </a:pPr>
           <a:r>
-            <a:rPr lang="en-US" sz="3100" kern="1200" dirty="0" err="1" smtClean="0"/>
+            <a:rPr lang="en-US" sz="2600" kern="1200" dirty="0" err="1" smtClean="0"/>
             <a:t>Due_date</a:t>
           </a:r>
-          <a:endParaRPr lang="en-US" sz="3100" kern="1200" dirty="0" smtClean="0"/>
+          <a:endParaRPr lang="en-US" sz="2600" kern="1200" dirty="0" smtClean="0"/>
         </a:p>
         <a:p>
-          <a:pPr lvl="0" algn="ctr" defTabSz="1377950">
+          <a:pPr lvl="0" algn="ctr" defTabSz="1155700">
             <a:lnSpc>
               <a:spcPct val="90000"/>
             </a:lnSpc>
@@ -1701,12 +1933,73 @@
             </a:spcAft>
           </a:pPr>
           <a:r>
-            <a:rPr lang="en-US" sz="3100" kern="1200" dirty="0" smtClean="0"/>
+            <a:rPr lang="en-US" sz="2600" kern="1200" dirty="0" smtClean="0"/>
             <a:t>Amount</a:t>
           </a:r>
+          <a:endParaRPr lang="en-US" sz="2600" kern="1200" dirty="0" smtClean="0"/>
         </a:p>
+      </dsp:txBody>
+      <dsp:txXfrm>
+        <a:off x="2875855" y="2029999"/>
+        <a:ext cx="2376289" cy="3045832"/>
+      </dsp:txXfrm>
+    </dsp:sp>
+    <dsp:sp modelId="{EE9B77B7-8CAF-4DD5-84D0-BF30A17822C7}">
+      <dsp:nvSpPr>
+        <dsp:cNvPr id="0" name=""/>
+        <dsp:cNvSpPr/>
+      </dsp:nvSpPr>
+      <dsp:spPr>
+        <a:xfrm>
+          <a:off x="5751710" y="2042879"/>
+          <a:ext cx="2376289" cy="3020061"/>
+        </a:xfrm>
+        <a:prstGeom prst="rect">
+          <a:avLst/>
+        </a:prstGeom>
+        <a:solidFill>
+          <a:schemeClr val="accent1">
+            <a:hueOff val="0"/>
+            <a:satOff val="0"/>
+            <a:lumOff val="0"/>
+            <a:alphaOff val="0"/>
+          </a:schemeClr>
+        </a:solidFill>
+        <a:ln w="12700" cap="flat" cmpd="sng" algn="ctr">
+          <a:solidFill>
+            <a:schemeClr val="lt1">
+              <a:hueOff val="0"/>
+              <a:satOff val="0"/>
+              <a:lumOff val="0"/>
+              <a:alphaOff val="0"/>
+            </a:schemeClr>
+          </a:solidFill>
+          <a:prstDash val="solid"/>
+          <a:miter lim="800000"/>
+        </a:ln>
+        <a:effectLst/>
+      </dsp:spPr>
+      <dsp:style>
+        <a:lnRef idx="2">
+          <a:scrgbClr r="0" g="0" b="0"/>
+        </a:lnRef>
+        <a:fillRef idx="1">
+          <a:scrgbClr r="0" g="0" b="0"/>
+        </a:fillRef>
+        <a:effectRef idx="0">
+          <a:scrgbClr r="0" g="0" b="0"/>
+        </a:effectRef>
+        <a:fontRef idx="minor">
+          <a:schemeClr val="lt1"/>
+        </a:fontRef>
+      </dsp:style>
+      <dsp:txBody>
+        <a:bodyPr spcFirstLastPara="0" vert="horz" wrap="square" lIns="16510" tIns="16510" rIns="16510" bIns="16510" numCol="1" spcCol="1270" anchor="ctr" anchorCtr="0">
+          <a:noAutofit/>
+        </a:bodyPr>
+        <a:lstStyle/>
         <a:p>
-          <a:pPr lvl="0" algn="ctr" defTabSz="1377950">
+          <a:pPr lvl="0" algn="ctr" defTabSz="1155700">
             <a:lnSpc>
               <a:spcPct val="90000"/>
             </a:lnSpc>
@@ -1718,14 +2011,99 @@
             </a:spcAft>
           </a:pPr>
           <a:r>
-            <a:rPr lang="en-US" sz="3100" kern="1200" dirty="0" smtClean="0"/>
-            <a:t>type</a:t>
+            <a:rPr lang="en-US" sz="2600" kern="1200" dirty="0" smtClean="0"/>
+            <a:t>TRANSACTOR</a:t>
+          </a:r>
+        </a:p>
+        <a:p>
+          <a:pPr lvl="0" algn="ctr" defTabSz="1155700">
+            <a:lnSpc>
+              <a:spcPct val="90000"/>
+            </a:lnSpc>
+            <a:spcBef>
+              <a:spcPct val="0"/>
+            </a:spcBef>
+            <a:spcAft>
+              <a:spcPct val="35000"/>
+            </a:spcAft>
+          </a:pPr>
+          <a:r>
+            <a:rPr lang="en-US" sz="2600" kern="1200" dirty="0" smtClean="0"/>
+            <a:t>Id</a:t>
+          </a:r>
+        </a:p>
+        <a:p>
+          <a:pPr lvl="0" algn="ctr" defTabSz="1155700">
+            <a:lnSpc>
+              <a:spcPct val="90000"/>
+            </a:lnSpc>
+            <a:spcBef>
+              <a:spcPct val="0"/>
+            </a:spcBef>
+            <a:spcAft>
+              <a:spcPct val="35000"/>
+            </a:spcAft>
+          </a:pPr>
+          <a:r>
+            <a:rPr lang="en-US" sz="2600" kern="1200" dirty="0" smtClean="0"/>
+            <a:t>Name</a:t>
+          </a:r>
+        </a:p>
+        <a:p>
+          <a:pPr lvl="0" algn="ctr" defTabSz="1155700">
+            <a:lnSpc>
+              <a:spcPct val="90000"/>
+            </a:lnSpc>
+            <a:spcBef>
+              <a:spcPct val="0"/>
+            </a:spcBef>
+            <a:spcAft>
+              <a:spcPct val="35000"/>
+            </a:spcAft>
+          </a:pPr>
+          <a:r>
+            <a:rPr lang="en-US" sz="2600" kern="1200" dirty="0" smtClean="0"/>
+            <a:t>Address</a:t>
+          </a:r>
+        </a:p>
+        <a:p>
+          <a:pPr lvl="0" algn="ctr" defTabSz="1155700">
+            <a:lnSpc>
+              <a:spcPct val="90000"/>
+            </a:lnSpc>
+            <a:spcBef>
+              <a:spcPct val="0"/>
+            </a:spcBef>
+            <a:spcAft>
+              <a:spcPct val="35000"/>
+            </a:spcAft>
+          </a:pPr>
+          <a:r>
+            <a:rPr lang="en-US" sz="2600" kern="1200" dirty="0" smtClean="0"/>
+            <a:t>Contact</a:t>
+          </a:r>
+        </a:p>
+        <a:p>
+          <a:pPr lvl="0" algn="ctr" defTabSz="1155700">
+            <a:lnSpc>
+              <a:spcPct val="90000"/>
+            </a:lnSpc>
+            <a:spcBef>
+              <a:spcPct val="0"/>
+            </a:spcBef>
+            <a:spcAft>
+              <a:spcPct val="35000"/>
+            </a:spcAft>
+          </a:pPr>
+          <a:r>
+            <a:rPr lang="en-US" sz="2600" kern="1200" dirty="0" smtClean="0"/>
+            <a:t>Terms</a:t>
           </a:r>
         </a:p>
       </dsp:txBody>
       <dsp:txXfrm>
-        <a:off x="4349452" y="1932141"/>
-        <a:ext cx="2718593" cy="3484584"/>
+        <a:off x="5751710" y="2042879"/>
+        <a:ext cx="2376289" cy="3020061"/>
       </dsp:txXfrm>
     </dsp:sp>
   </dsp:spTree>
@@ -6776,7 +7154,7 @@
           <p:nvPr>
             <p:extLst>
               <p:ext uri="{D42A27DB-BD31-4B8C-83A1-F6EECF244321}">
-                <p14:modId xmlns:p14="http://schemas.microsoft.com/office/powerpoint/2010/main" val="74402315"/>
+                <p14:modId xmlns:p14="http://schemas.microsoft.com/office/powerpoint/2010/main" val="2494362857"/>
               </p:ext>
             </p:extLst>
           </p:nvPr>

</xml_diff>

<commit_message>
added Req Specs, modified DB design
</commit_message>
<xml_diff>
--- a/TV5 Documents/Database Design.pptx
+++ b/TV5 Documents/Database Design.pptx
@@ -931,8 +931,22 @@
         <a:p>
           <a:r>
             <a:rPr lang="en-US" dirty="0" smtClean="0"/>
-            <a:t>Name</a:t>
+            <a:t>Username</a:t>
           </a:r>
+        </a:p>
+        <a:p>
+          <a:r>
+            <a:rPr lang="en-US" dirty="0" err="1" smtClean="0"/>
+            <a:t>Fname</a:t>
+          </a:r>
+          <a:endParaRPr lang="en-US" dirty="0" smtClean="0"/>
+        </a:p>
+        <a:p>
+          <a:r>
+            <a:rPr lang="en-US" dirty="0" err="1" smtClean="0"/>
+            <a:t>LName</a:t>
+          </a:r>
+          <a:endParaRPr lang="en-US" dirty="0" smtClean="0"/>
         </a:p>
         <a:p>
           <a:r>
@@ -944,6 +958,39 @@
           <a:r>
             <a:rPr lang="en-US" dirty="0" smtClean="0"/>
             <a:t>Type</a:t>
+          </a:r>
+        </a:p>
+        <a:p>
+          <a:r>
+            <a:rPr lang="en-US" dirty="0" smtClean="0"/>
+            <a:t>status</a:t>
+          </a:r>
+        </a:p>
+        <a:p>
+          <a:r>
+            <a:rPr lang="en-US" dirty="0" err="1" smtClean="0"/>
+            <a:t>Updated_by</a:t>
+          </a:r>
+          <a:endParaRPr lang="en-US" dirty="0" smtClean="0"/>
+        </a:p>
+        <a:p>
+          <a:r>
+            <a:rPr lang="en-US" dirty="0" err="1" smtClean="0"/>
+            <a:t>Created_by</a:t>
+          </a:r>
+          <a:endParaRPr lang="en-US" dirty="0" smtClean="0"/>
+        </a:p>
+        <a:p>
+          <a:r>
+            <a:rPr lang="en-US" dirty="0" err="1" smtClean="0"/>
+            <a:t>Date_created</a:t>
+          </a:r>
+          <a:endParaRPr lang="en-US" dirty="0" smtClean="0"/>
+        </a:p>
+        <a:p>
+          <a:r>
+            <a:rPr lang="en-US" dirty="0" err="1" smtClean="0"/>
+            <a:t>Date_updated</a:t>
           </a:r>
           <a:endParaRPr lang="en-US" dirty="0" smtClean="0"/>
         </a:p>
@@ -1007,6 +1054,33 @@
             <a:rPr lang="en-US" dirty="0" smtClean="0"/>
             <a:t>Amount</a:t>
           </a:r>
+        </a:p>
+        <a:p>
+          <a:r>
+            <a:rPr lang="en-US" dirty="0" err="1" smtClean="0"/>
+            <a:t>Updated_by</a:t>
+          </a:r>
+          <a:endParaRPr lang="en-US" dirty="0" smtClean="0"/>
+        </a:p>
+        <a:p>
+          <a:r>
+            <a:rPr lang="en-US" dirty="0" err="1" smtClean="0"/>
+            <a:t>Created_by</a:t>
+          </a:r>
+          <a:endParaRPr lang="en-US" dirty="0" smtClean="0"/>
+        </a:p>
+        <a:p>
+          <a:r>
+            <a:rPr lang="en-US" dirty="0" err="1" smtClean="0"/>
+            <a:t>Date_created</a:t>
+          </a:r>
+          <a:endParaRPr lang="en-US" dirty="0" smtClean="0"/>
+        </a:p>
+        <a:p>
+          <a:r>
+            <a:rPr lang="en-US" dirty="0" err="1" smtClean="0"/>
+            <a:t>Date_updated</a:t>
+          </a:r>
           <a:endParaRPr lang="en-US" dirty="0" smtClean="0"/>
         </a:p>
       </dgm:t>
@@ -1074,6 +1148,34 @@
             <a:rPr lang="en-US" dirty="0" smtClean="0"/>
             <a:t>Terms</a:t>
           </a:r>
+        </a:p>
+        <a:p>
+          <a:r>
+            <a:rPr lang="en-US" dirty="0" err="1" smtClean="0"/>
+            <a:t>Updated_by</a:t>
+          </a:r>
+          <a:endParaRPr lang="en-US" dirty="0" smtClean="0"/>
+        </a:p>
+        <a:p>
+          <a:r>
+            <a:rPr lang="en-US" dirty="0" err="1" smtClean="0"/>
+            <a:t>Created_by</a:t>
+          </a:r>
+          <a:endParaRPr lang="en-US" dirty="0" smtClean="0"/>
+        </a:p>
+        <a:p>
+          <a:r>
+            <a:rPr lang="en-US" dirty="0" err="1" smtClean="0"/>
+            <a:t>Date_created</a:t>
+          </a:r>
+          <a:endParaRPr lang="en-US" dirty="0" smtClean="0"/>
+        </a:p>
+        <a:p>
+          <a:r>
+            <a:rPr lang="en-US" smtClean="0"/>
+            <a:t>Date_updated</a:t>
+          </a:r>
+          <a:endParaRPr lang="en-US" dirty="0" smtClean="0"/>
         </a:p>
       </dgm:t>
     </dgm:pt>
@@ -1185,7 +1287,7 @@
       <dgm:spPr/>
     </dgm:pt>
     <dgm:pt modelId="{6BA5266E-E703-41BB-884E-5DA0E682DFF2}" type="pres">
-      <dgm:prSet presAssocID="{3E4D2293-DFF4-45AC-8401-79606217904F}" presName="rootText" presStyleLbl="node2" presStyleIdx="0" presStyleCnt="3" custScaleY="250110">
+      <dgm:prSet presAssocID="{3E4D2293-DFF4-45AC-8401-79606217904F}" presName="rootText" presStyleLbl="node2" presStyleIdx="0" presStyleCnt="3" custScaleY="559553">
         <dgm:presLayoutVars>
           <dgm:chPref val="3"/>
         </dgm:presLayoutVars>
@@ -1242,7 +1344,7 @@
       <dgm:spPr/>
     </dgm:pt>
     <dgm:pt modelId="{DE4162F5-84B7-4163-BE88-51D88E4CCC3A}" type="pres">
-      <dgm:prSet presAssocID="{CFF9B51C-9053-4E9F-B6CC-310848D0831B}" presName="rootText" presStyleLbl="node2" presStyleIdx="1" presStyleCnt="3" custScaleY="256352">
+      <dgm:prSet presAssocID="{CFF9B51C-9053-4E9F-B6CC-310848D0831B}" presName="rootText" presStyleLbl="node2" presStyleIdx="1" presStyleCnt="3" custScaleY="483384">
         <dgm:presLayoutVars>
           <dgm:chPref val="3"/>
         </dgm:presLayoutVars>
@@ -1278,6 +1380,13 @@
     <dgm:pt modelId="{E4E7F68B-F7BE-48F8-B501-2C2192C41253}" type="pres">
       <dgm:prSet presAssocID="{550CFEC4-056F-4906-A899-41AEE10B5F84}" presName="Name37" presStyleLbl="parChTrans1D2" presStyleIdx="2" presStyleCnt="3"/>
       <dgm:spPr/>
+      <dgm:t>
+        <a:bodyPr/>
+        <a:lstStyle/>
+        <a:p>
+          <a:endParaRPr lang="en-US"/>
+        </a:p>
+      </dgm:t>
     </dgm:pt>
     <dgm:pt modelId="{4A8E523E-9E69-472A-8625-59FB3C455686}" type="pres">
       <dgm:prSet presAssocID="{5D812574-A608-41AF-ACF6-187FB40929E8}" presName="hierRoot2" presStyleCnt="0">
@@ -1292,7 +1401,7 @@
       <dgm:spPr/>
     </dgm:pt>
     <dgm:pt modelId="{EE9B77B7-8CAF-4DD5-84D0-BF30A17822C7}" type="pres">
-      <dgm:prSet presAssocID="{5D812574-A608-41AF-ACF6-187FB40929E8}" presName="rootText" presStyleLbl="node2" presStyleIdx="2" presStyleCnt="3" custScaleY="254183" custLinFactNeighborX="15198" custLinFactNeighborY="1084">
+      <dgm:prSet presAssocID="{5D812574-A608-41AF-ACF6-187FB40929E8}" presName="rootText" presStyleLbl="node2" presStyleIdx="2" presStyleCnt="3" custScaleY="418338" custLinFactNeighborX="15198" custLinFactNeighborY="1084">
         <dgm:presLayoutVars>
           <dgm:chPref val="3"/>
         </dgm:presLayoutVars>
@@ -1331,22 +1440,22 @@
     </dgm:pt>
   </dgm:ptLst>
   <dgm:cxnLst>
+    <dgm:cxn modelId="{578C882B-990E-4B20-BF4A-5F0BFA9C0EF1}" type="presOf" srcId="{3E4D2293-DFF4-45AC-8401-79606217904F}" destId="{69F2C21C-B810-43FB-B5CD-D32327ACA5FF}" srcOrd="1" destOrd="0" presId="urn:microsoft.com/office/officeart/2005/8/layout/orgChart1"/>
     <dgm:cxn modelId="{C2900931-C433-495F-BB08-A518EFAC1C29}" srcId="{E2A92887-A672-4E6D-8651-2CB9341CAF0B}" destId="{5D812574-A608-41AF-ACF6-187FB40929E8}" srcOrd="2" destOrd="0" parTransId="{550CFEC4-056F-4906-A899-41AEE10B5F84}" sibTransId="{29F35757-BFA4-4168-9474-D1A2D2A01BEE}"/>
-    <dgm:cxn modelId="{AFAEE589-98FE-48D3-8EB5-6246419F16BC}" srcId="{E2A92887-A672-4E6D-8651-2CB9341CAF0B}" destId="{CFF9B51C-9053-4E9F-B6CC-310848D0831B}" srcOrd="1" destOrd="0" parTransId="{735760E6-3470-4300-ADF1-08A0AED09C04}" sibTransId="{D34066D8-4AA2-4CB1-BDDB-EE15D9692E67}"/>
+    <dgm:cxn modelId="{E1B67E3D-0108-4444-9606-51368A9D8D1D}" type="presOf" srcId="{E2A92887-A672-4E6D-8651-2CB9341CAF0B}" destId="{CFB9A543-E78E-44CE-A6A4-A90DCF165B85}" srcOrd="1" destOrd="0" presId="urn:microsoft.com/office/officeart/2005/8/layout/orgChart1"/>
+    <dgm:cxn modelId="{50320B9F-B0A4-4701-9B66-80BE951E2602}" type="presOf" srcId="{2A435F72-4A71-4C4E-80D1-F2D1A7A3E811}" destId="{839B53E8-1EB7-4186-9CCA-B051B4381E5B}" srcOrd="0" destOrd="0" presId="urn:microsoft.com/office/officeart/2005/8/layout/orgChart1"/>
+    <dgm:cxn modelId="{DE3A3D18-C68F-4384-8430-77E21BE5F015}" type="presOf" srcId="{CFF9B51C-9053-4E9F-B6CC-310848D0831B}" destId="{DE4162F5-84B7-4163-BE88-51D88E4CCC3A}" srcOrd="0" destOrd="0" presId="urn:microsoft.com/office/officeart/2005/8/layout/orgChart1"/>
+    <dgm:cxn modelId="{578C87CC-18A9-4E66-BDC7-07DF05B34EF3}" type="presOf" srcId="{735760E6-3470-4300-ADF1-08A0AED09C04}" destId="{41DF7830-6212-4FDF-9C4A-7BC07A340CB9}" srcOrd="0" destOrd="0" presId="urn:microsoft.com/office/officeart/2005/8/layout/orgChart1"/>
+    <dgm:cxn modelId="{27B6CBA0-6C12-4919-983B-2E8F38E9B626}" srcId="{2A435F72-4A71-4C4E-80D1-F2D1A7A3E811}" destId="{E2A92887-A672-4E6D-8651-2CB9341CAF0B}" srcOrd="0" destOrd="0" parTransId="{6369FC28-AA3E-4C1E-92A6-6022A33265F1}" sibTransId="{8E42ACC0-9BB8-4B3C-A295-9179F60FD18B}"/>
     <dgm:cxn modelId="{F82EC2DD-22ED-49B0-A0DF-D7E9D6D28C2A}" type="presOf" srcId="{5D812574-A608-41AF-ACF6-187FB40929E8}" destId="{EE9B77B7-8CAF-4DD5-84D0-BF30A17822C7}" srcOrd="0" destOrd="0" presId="urn:microsoft.com/office/officeart/2005/8/layout/orgChart1"/>
     <dgm:cxn modelId="{1E2A5ADC-2492-4336-9829-AE9D60BD2CBE}" type="presOf" srcId="{5D812574-A608-41AF-ACF6-187FB40929E8}" destId="{343D6150-8A83-42FF-BA16-AFEC62A87F81}" srcOrd="1" destOrd="0" presId="urn:microsoft.com/office/officeart/2005/8/layout/orgChart1"/>
-    <dgm:cxn modelId="{578C87CC-18A9-4E66-BDC7-07DF05B34EF3}" type="presOf" srcId="{735760E6-3470-4300-ADF1-08A0AED09C04}" destId="{41DF7830-6212-4FDF-9C4A-7BC07A340CB9}" srcOrd="0" destOrd="0" presId="urn:microsoft.com/office/officeart/2005/8/layout/orgChart1"/>
+    <dgm:cxn modelId="{AFAEE589-98FE-48D3-8EB5-6246419F16BC}" srcId="{E2A92887-A672-4E6D-8651-2CB9341CAF0B}" destId="{CFF9B51C-9053-4E9F-B6CC-310848D0831B}" srcOrd="1" destOrd="0" parTransId="{735760E6-3470-4300-ADF1-08A0AED09C04}" sibTransId="{D34066D8-4AA2-4CB1-BDDB-EE15D9692E67}"/>
+    <dgm:cxn modelId="{A799C299-1847-4061-9214-EDAF04757BF6}" srcId="{E2A92887-A672-4E6D-8651-2CB9341CAF0B}" destId="{3E4D2293-DFF4-45AC-8401-79606217904F}" srcOrd="0" destOrd="0" parTransId="{8648D618-0BBF-4046-AC48-281B4ED8E7B2}" sibTransId="{F8B3E8F9-79D6-40DC-9402-5B1585BBA6AA}"/>
+    <dgm:cxn modelId="{A91FCA41-931F-4268-B1BD-258C6E68F374}" type="presOf" srcId="{CFF9B51C-9053-4E9F-B6CC-310848D0831B}" destId="{9A143976-E2D7-400B-AC70-FEEFD145A457}" srcOrd="1" destOrd="0" presId="urn:microsoft.com/office/officeart/2005/8/layout/orgChart1"/>
+    <dgm:cxn modelId="{69DA603F-F9A6-4153-8C11-CBF4BA1B4615}" type="presOf" srcId="{8648D618-0BBF-4046-AC48-281B4ED8E7B2}" destId="{2788EE1B-B7B5-4309-A8E4-2C34F3A478A8}" srcOrd="0" destOrd="0" presId="urn:microsoft.com/office/officeart/2005/8/layout/orgChart1"/>
+    <dgm:cxn modelId="{3DF7DF0E-7057-430D-A6DC-095D0B59F07F}" type="presOf" srcId="{E2A92887-A672-4E6D-8651-2CB9341CAF0B}" destId="{19A041D5-A0A5-4B7C-B1A6-0D2A6404D85F}" srcOrd="0" destOrd="0" presId="urn:microsoft.com/office/officeart/2005/8/layout/orgChart1"/>
+    <dgm:cxn modelId="{3E9881AD-73FA-4F82-9A49-FB28308E90E3}" type="presOf" srcId="{550CFEC4-056F-4906-A899-41AEE10B5F84}" destId="{E4E7F68B-F7BE-48F8-B501-2C2192C41253}" srcOrd="0" destOrd="0" presId="urn:microsoft.com/office/officeart/2005/8/layout/orgChart1"/>
     <dgm:cxn modelId="{D1BCF0D8-5FE6-45C3-A654-57D81FC660A5}" type="presOf" srcId="{3E4D2293-DFF4-45AC-8401-79606217904F}" destId="{6BA5266E-E703-41BB-884E-5DA0E682DFF2}" srcOrd="0" destOrd="0" presId="urn:microsoft.com/office/officeart/2005/8/layout/orgChart1"/>
-    <dgm:cxn modelId="{578C882B-990E-4B20-BF4A-5F0BFA9C0EF1}" type="presOf" srcId="{3E4D2293-DFF4-45AC-8401-79606217904F}" destId="{69F2C21C-B810-43FB-B5CD-D32327ACA5FF}" srcOrd="1" destOrd="0" presId="urn:microsoft.com/office/officeart/2005/8/layout/orgChart1"/>
-    <dgm:cxn modelId="{A91FCA41-931F-4268-B1BD-258C6E68F374}" type="presOf" srcId="{CFF9B51C-9053-4E9F-B6CC-310848D0831B}" destId="{9A143976-E2D7-400B-AC70-FEEFD145A457}" srcOrd="1" destOrd="0" presId="urn:microsoft.com/office/officeart/2005/8/layout/orgChart1"/>
-    <dgm:cxn modelId="{3DF7DF0E-7057-430D-A6DC-095D0B59F07F}" type="presOf" srcId="{E2A92887-A672-4E6D-8651-2CB9341CAF0B}" destId="{19A041D5-A0A5-4B7C-B1A6-0D2A6404D85F}" srcOrd="0" destOrd="0" presId="urn:microsoft.com/office/officeart/2005/8/layout/orgChart1"/>
-    <dgm:cxn modelId="{E1B67E3D-0108-4444-9606-51368A9D8D1D}" type="presOf" srcId="{E2A92887-A672-4E6D-8651-2CB9341CAF0B}" destId="{CFB9A543-E78E-44CE-A6A4-A90DCF165B85}" srcOrd="1" destOrd="0" presId="urn:microsoft.com/office/officeart/2005/8/layout/orgChart1"/>
-    <dgm:cxn modelId="{3E9881AD-73FA-4F82-9A49-FB28308E90E3}" type="presOf" srcId="{550CFEC4-056F-4906-A899-41AEE10B5F84}" destId="{E4E7F68B-F7BE-48F8-B501-2C2192C41253}" srcOrd="0" destOrd="0" presId="urn:microsoft.com/office/officeart/2005/8/layout/orgChart1"/>
-    <dgm:cxn modelId="{A799C299-1847-4061-9214-EDAF04757BF6}" srcId="{E2A92887-A672-4E6D-8651-2CB9341CAF0B}" destId="{3E4D2293-DFF4-45AC-8401-79606217904F}" srcOrd="0" destOrd="0" parTransId="{8648D618-0BBF-4046-AC48-281B4ED8E7B2}" sibTransId="{F8B3E8F9-79D6-40DC-9402-5B1585BBA6AA}"/>
-    <dgm:cxn modelId="{69DA603F-F9A6-4153-8C11-CBF4BA1B4615}" type="presOf" srcId="{8648D618-0BBF-4046-AC48-281B4ED8E7B2}" destId="{2788EE1B-B7B5-4309-A8E4-2C34F3A478A8}" srcOrd="0" destOrd="0" presId="urn:microsoft.com/office/officeart/2005/8/layout/orgChart1"/>
-    <dgm:cxn modelId="{DE3A3D18-C68F-4384-8430-77E21BE5F015}" type="presOf" srcId="{CFF9B51C-9053-4E9F-B6CC-310848D0831B}" destId="{DE4162F5-84B7-4163-BE88-51D88E4CCC3A}" srcOrd="0" destOrd="0" presId="urn:microsoft.com/office/officeart/2005/8/layout/orgChart1"/>
-    <dgm:cxn modelId="{27B6CBA0-6C12-4919-983B-2E8F38E9B626}" srcId="{2A435F72-4A71-4C4E-80D1-F2D1A7A3E811}" destId="{E2A92887-A672-4E6D-8651-2CB9341CAF0B}" srcOrd="0" destOrd="0" parTransId="{6369FC28-AA3E-4C1E-92A6-6022A33265F1}" sibTransId="{8E42ACC0-9BB8-4B3C-A295-9179F60FD18B}"/>
-    <dgm:cxn modelId="{50320B9F-B0A4-4701-9B66-80BE951E2602}" type="presOf" srcId="{2A435F72-4A71-4C4E-80D1-F2D1A7A3E811}" destId="{839B53E8-1EB7-4186-9CCA-B051B4381E5B}" srcOrd="0" destOrd="0" presId="urn:microsoft.com/office/officeart/2005/8/layout/orgChart1"/>
     <dgm:cxn modelId="{B241CD0E-A291-4909-800B-F8950D8472A3}" type="presParOf" srcId="{839B53E8-1EB7-4186-9CCA-B051B4381E5B}" destId="{F25EA383-E7EB-4AF8-A0B9-601CB3B26BD9}" srcOrd="0" destOrd="0" presId="urn:microsoft.com/office/officeart/2005/8/layout/orgChart1"/>
     <dgm:cxn modelId="{ED29952C-211F-4CA0-AE6C-0C84AA02D97E}" type="presParOf" srcId="{F25EA383-E7EB-4AF8-A0B9-601CB3B26BD9}" destId="{0DFC4767-F12F-403F-BB3B-D7E7157C2B37}" srcOrd="0" destOrd="0" presId="urn:microsoft.com/office/officeart/2005/8/layout/orgChart1"/>
     <dgm:cxn modelId="{4A32362E-5E61-4529-A71D-402762913E4E}" type="presParOf" srcId="{0DFC4767-F12F-403F-BB3B-D7E7157C2B37}" destId="{19A041D5-A0A5-4B7C-B1A6-0D2A6404D85F}" srcOrd="0" destOrd="0" presId="urn:microsoft.com/office/officeart/2005/8/layout/orgChart1"/>
@@ -1400,8 +1509,8 @@
       </dsp:nvSpPr>
       <dsp:spPr>
         <a:xfrm>
-          <a:off x="4064000" y="1530979"/>
-          <a:ext cx="2875855" cy="511900"/>
+          <a:off x="4064000" y="774778"/>
+          <a:ext cx="2101332" cy="332361"/>
         </a:xfrm>
         <a:custGeom>
           <a:avLst/>
@@ -1415,13 +1524,13 @@
                 <a:pt x="0" y="0"/>
               </a:moveTo>
               <a:lnTo>
-                <a:pt x="0" y="262389"/>
+                <a:pt x="0" y="170361"/>
               </a:lnTo>
               <a:lnTo>
-                <a:pt x="2875855" y="262389"/>
+                <a:pt x="2101332" y="170361"/>
               </a:lnTo>
               <a:lnTo>
-                <a:pt x="2875855" y="511900"/>
+                <a:pt x="2101332" y="332361"/>
               </a:lnTo>
             </a:path>
           </a:pathLst>
@@ -1462,8 +1571,8 @@
       </dsp:nvSpPr>
       <dsp:spPr>
         <a:xfrm>
-          <a:off x="4018280" y="1530979"/>
-          <a:ext cx="91440" cy="499020"/>
+          <a:off x="4018280" y="774778"/>
+          <a:ext cx="91440" cy="323998"/>
         </a:xfrm>
         <a:custGeom>
           <a:avLst/>
@@ -1477,7 +1586,7 @@
                 <a:pt x="45720" y="0"/>
               </a:moveTo>
               <a:lnTo>
-                <a:pt x="45720" y="499020"/>
+                <a:pt x="45720" y="323998"/>
               </a:lnTo>
             </a:path>
           </a:pathLst>
@@ -1518,8 +1627,8 @@
       </dsp:nvSpPr>
       <dsp:spPr>
         <a:xfrm>
-          <a:off x="1188690" y="1530979"/>
-          <a:ext cx="2875309" cy="499020"/>
+          <a:off x="2197149" y="774778"/>
+          <a:ext cx="1866850" cy="323998"/>
         </a:xfrm>
         <a:custGeom>
           <a:avLst/>
@@ -1530,16 +1639,16 @@
           <a:pathLst>
             <a:path>
               <a:moveTo>
-                <a:pt x="2875309" y="0"/>
+                <a:pt x="1866850" y="0"/>
               </a:moveTo>
               <a:lnTo>
-                <a:pt x="2875309" y="249510"/>
+                <a:pt x="1866850" y="161999"/>
               </a:lnTo>
               <a:lnTo>
-                <a:pt x="0" y="249510"/>
+                <a:pt x="0" y="161999"/>
               </a:lnTo>
               <a:lnTo>
-                <a:pt x="0" y="499020"/>
+                <a:pt x="0" y="323998"/>
               </a:lnTo>
             </a:path>
           </a:pathLst>
@@ -1580,8 +1689,8 @@
       </dsp:nvSpPr>
       <dsp:spPr>
         <a:xfrm>
-          <a:off x="2875855" y="342834"/>
-          <a:ext cx="2376289" cy="1188144"/>
+          <a:off x="3292574" y="3353"/>
+          <a:ext cx="1542851" cy="771425"/>
         </a:xfrm>
         <a:prstGeom prst="rect">
           <a:avLst/>
@@ -1623,12 +1732,12 @@
         </a:fontRef>
       </dsp:style>
       <dsp:txBody>
-        <a:bodyPr spcFirstLastPara="0" vert="horz" wrap="square" lIns="16510" tIns="16510" rIns="16510" bIns="16510" numCol="1" spcCol="1270" anchor="ctr" anchorCtr="0">
+        <a:bodyPr spcFirstLastPara="0" vert="horz" wrap="square" lIns="10795" tIns="10795" rIns="10795" bIns="10795" numCol="1" spcCol="1270" anchor="ctr" anchorCtr="0">
           <a:noAutofit/>
         </a:bodyPr>
         <a:lstStyle/>
         <a:p>
-          <a:pPr lvl="0" algn="ctr" defTabSz="1155700">
+          <a:pPr lvl="0" algn="ctr" defTabSz="755650">
             <a:lnSpc>
               <a:spcPct val="90000"/>
             </a:lnSpc>
@@ -1640,15 +1749,15 @@
             </a:spcAft>
           </a:pPr>
           <a:r>
-            <a:rPr lang="en-US" sz="2600" kern="1200" dirty="0" err="1" smtClean="0"/>
+            <a:rPr lang="en-US" sz="1700" kern="1200" dirty="0" err="1" smtClean="0"/>
             <a:t>Datastore</a:t>
           </a:r>
-          <a:endParaRPr lang="en-US" sz="2600" kern="1200" dirty="0"/>
+          <a:endParaRPr lang="en-US" sz="1700" kern="1200" dirty="0"/>
         </a:p>
       </dsp:txBody>
       <dsp:txXfrm>
-        <a:off x="2875855" y="342834"/>
-        <a:ext cx="2376289" cy="1188144"/>
+        <a:off x="3292574" y="3353"/>
+        <a:ext cx="1542851" cy="771425"/>
       </dsp:txXfrm>
     </dsp:sp>
     <dsp:sp modelId="{6BA5266E-E703-41BB-884E-5DA0E682DFF2}">
@@ -1658,8 +1767,8 @@
       </dsp:nvSpPr>
       <dsp:spPr>
         <a:xfrm>
-          <a:off x="545" y="2029999"/>
-          <a:ext cx="2376289" cy="2971668"/>
+          <a:off x="1425723" y="1098777"/>
+          <a:ext cx="1542851" cy="4316536"/>
         </a:xfrm>
         <a:prstGeom prst="rect">
           <a:avLst/>
@@ -1701,12 +1810,12 @@
         </a:fontRef>
       </dsp:style>
       <dsp:txBody>
-        <a:bodyPr spcFirstLastPara="0" vert="horz" wrap="square" lIns="16510" tIns="16510" rIns="16510" bIns="16510" numCol="1" spcCol="1270" anchor="ctr" anchorCtr="0">
+        <a:bodyPr spcFirstLastPara="0" vert="horz" wrap="square" lIns="10795" tIns="10795" rIns="10795" bIns="10795" numCol="1" spcCol="1270" anchor="ctr" anchorCtr="0">
           <a:noAutofit/>
         </a:bodyPr>
         <a:lstStyle/>
         <a:p>
-          <a:pPr lvl="0" algn="ctr" defTabSz="1155700">
+          <a:pPr lvl="0" algn="ctr" defTabSz="755650">
             <a:lnSpc>
               <a:spcPct val="90000"/>
             </a:lnSpc>
@@ -1718,12 +1827,12 @@
             </a:spcAft>
           </a:pPr>
           <a:r>
-            <a:rPr lang="en-US" sz="2600" kern="1200" dirty="0" smtClean="0"/>
+            <a:rPr lang="en-US" sz="1700" kern="1200" dirty="0" smtClean="0"/>
             <a:t>USER</a:t>
           </a:r>
         </a:p>
         <a:p>
-          <a:pPr lvl="0" algn="ctr" defTabSz="1155700">
+          <a:pPr lvl="0" algn="ctr" defTabSz="755650">
             <a:lnSpc>
               <a:spcPct val="90000"/>
             </a:lnSpc>
@@ -1735,12 +1844,12 @@
             </a:spcAft>
           </a:pPr>
           <a:r>
-            <a:rPr lang="en-US" sz="2600" kern="1200" dirty="0" smtClean="0"/>
+            <a:rPr lang="en-US" sz="1700" kern="1200" dirty="0" smtClean="0"/>
             <a:t>Id</a:t>
           </a:r>
         </a:p>
         <a:p>
-          <a:pPr lvl="0" algn="ctr" defTabSz="1155700">
+          <a:pPr lvl="0" algn="ctr" defTabSz="755650">
             <a:lnSpc>
               <a:spcPct val="90000"/>
             </a:lnSpc>
@@ -1752,12 +1861,12 @@
             </a:spcAft>
           </a:pPr>
           <a:r>
-            <a:rPr lang="en-US" sz="2600" kern="1200" dirty="0" smtClean="0"/>
-            <a:t>Name</a:t>
+            <a:rPr lang="en-US" sz="1700" kern="1200" dirty="0" smtClean="0"/>
+            <a:t>Username</a:t>
           </a:r>
         </a:p>
         <a:p>
-          <a:pPr lvl="0" algn="ctr" defTabSz="1155700">
+          <a:pPr lvl="0" algn="ctr" defTabSz="755650">
             <a:lnSpc>
               <a:spcPct val="90000"/>
             </a:lnSpc>
@@ -1769,12 +1878,13 @@
             </a:spcAft>
           </a:pPr>
           <a:r>
-            <a:rPr lang="en-US" sz="2600" kern="1200" dirty="0" smtClean="0"/>
-            <a:t>Password</a:t>
+            <a:rPr lang="en-US" sz="1700" kern="1200" dirty="0" err="1" smtClean="0"/>
+            <a:t>Fname</a:t>
           </a:r>
-        </a:p>
-        <a:p>
-          <a:pPr lvl="0" algn="ctr" defTabSz="1155700">
+          <a:endParaRPr lang="en-US" sz="1700" kern="1200" dirty="0" smtClean="0"/>
+        </a:p>
+        <a:p>
+          <a:pPr lvl="0" algn="ctr" defTabSz="755650">
             <a:lnSpc>
               <a:spcPct val="90000"/>
             </a:lnSpc>
@@ -1786,15 +1896,138 @@
             </a:spcAft>
           </a:pPr>
           <a:r>
-            <a:rPr lang="en-US" sz="2600" kern="1200" dirty="0" smtClean="0"/>
+            <a:rPr lang="en-US" sz="1700" kern="1200" dirty="0" err="1" smtClean="0"/>
+            <a:t>LName</a:t>
+          </a:r>
+          <a:endParaRPr lang="en-US" sz="1700" kern="1200" dirty="0" smtClean="0"/>
+        </a:p>
+        <a:p>
+          <a:pPr lvl="0" algn="ctr" defTabSz="755650">
+            <a:lnSpc>
+              <a:spcPct val="90000"/>
+            </a:lnSpc>
+            <a:spcBef>
+              <a:spcPct val="0"/>
+            </a:spcBef>
+            <a:spcAft>
+              <a:spcPct val="35000"/>
+            </a:spcAft>
+          </a:pPr>
+          <a:r>
+            <a:rPr lang="en-US" sz="1700" kern="1200" dirty="0" smtClean="0"/>
+            <a:t>Password</a:t>
+          </a:r>
+        </a:p>
+        <a:p>
+          <a:pPr lvl="0" algn="ctr" defTabSz="755650">
+            <a:lnSpc>
+              <a:spcPct val="90000"/>
+            </a:lnSpc>
+            <a:spcBef>
+              <a:spcPct val="0"/>
+            </a:spcBef>
+            <a:spcAft>
+              <a:spcPct val="35000"/>
+            </a:spcAft>
+          </a:pPr>
+          <a:r>
+            <a:rPr lang="en-US" sz="1700" kern="1200" dirty="0" smtClean="0"/>
             <a:t>Type</a:t>
           </a:r>
-          <a:endParaRPr lang="en-US" sz="2600" kern="1200" dirty="0" smtClean="0"/>
+        </a:p>
+        <a:p>
+          <a:pPr lvl="0" algn="ctr" defTabSz="755650">
+            <a:lnSpc>
+              <a:spcPct val="90000"/>
+            </a:lnSpc>
+            <a:spcBef>
+              <a:spcPct val="0"/>
+            </a:spcBef>
+            <a:spcAft>
+              <a:spcPct val="35000"/>
+            </a:spcAft>
+          </a:pPr>
+          <a:r>
+            <a:rPr lang="en-US" sz="1700" kern="1200" dirty="0" smtClean="0"/>
+            <a:t>status</a:t>
+          </a:r>
+        </a:p>
+        <a:p>
+          <a:pPr lvl="0" algn="ctr" defTabSz="755650">
+            <a:lnSpc>
+              <a:spcPct val="90000"/>
+            </a:lnSpc>
+            <a:spcBef>
+              <a:spcPct val="0"/>
+            </a:spcBef>
+            <a:spcAft>
+              <a:spcPct val="35000"/>
+            </a:spcAft>
+          </a:pPr>
+          <a:r>
+            <a:rPr lang="en-US" sz="1700" kern="1200" dirty="0" err="1" smtClean="0"/>
+            <a:t>Updated_by</a:t>
+          </a:r>
+          <a:endParaRPr lang="en-US" sz="1700" kern="1200" dirty="0" smtClean="0"/>
+        </a:p>
+        <a:p>
+          <a:pPr lvl="0" algn="ctr" defTabSz="755650">
+            <a:lnSpc>
+              <a:spcPct val="90000"/>
+            </a:lnSpc>
+            <a:spcBef>
+              <a:spcPct val="0"/>
+            </a:spcBef>
+            <a:spcAft>
+              <a:spcPct val="35000"/>
+            </a:spcAft>
+          </a:pPr>
+          <a:r>
+            <a:rPr lang="en-US" sz="1700" kern="1200" dirty="0" err="1" smtClean="0"/>
+            <a:t>Created_by</a:t>
+          </a:r>
+          <a:endParaRPr lang="en-US" sz="1700" kern="1200" dirty="0" smtClean="0"/>
+        </a:p>
+        <a:p>
+          <a:pPr lvl="0" algn="ctr" defTabSz="755650">
+            <a:lnSpc>
+              <a:spcPct val="90000"/>
+            </a:lnSpc>
+            <a:spcBef>
+              <a:spcPct val="0"/>
+            </a:spcBef>
+            <a:spcAft>
+              <a:spcPct val="35000"/>
+            </a:spcAft>
+          </a:pPr>
+          <a:r>
+            <a:rPr lang="en-US" sz="1700" kern="1200" dirty="0" err="1" smtClean="0"/>
+            <a:t>Date_created</a:t>
+          </a:r>
+          <a:endParaRPr lang="en-US" sz="1700" kern="1200" dirty="0" smtClean="0"/>
+        </a:p>
+        <a:p>
+          <a:pPr lvl="0" algn="ctr" defTabSz="755650">
+            <a:lnSpc>
+              <a:spcPct val="90000"/>
+            </a:lnSpc>
+            <a:spcBef>
+              <a:spcPct val="0"/>
+            </a:spcBef>
+            <a:spcAft>
+              <a:spcPct val="35000"/>
+            </a:spcAft>
+          </a:pPr>
+          <a:r>
+            <a:rPr lang="en-US" sz="1700" kern="1200" dirty="0" err="1" smtClean="0"/>
+            <a:t>Date_updated</a:t>
+          </a:r>
+          <a:endParaRPr lang="en-US" sz="1700" kern="1200" dirty="0" smtClean="0"/>
         </a:p>
       </dsp:txBody>
       <dsp:txXfrm>
-        <a:off x="545" y="2029999"/>
-        <a:ext cx="2376289" cy="2971668"/>
+        <a:off x="1425723" y="1098777"/>
+        <a:ext cx="1542851" cy="4316536"/>
       </dsp:txXfrm>
     </dsp:sp>
     <dsp:sp modelId="{DE4162F5-84B7-4163-BE88-51D88E4CCC3A}">
@@ -1804,8 +2037,8 @@
       </dsp:nvSpPr>
       <dsp:spPr>
         <a:xfrm>
-          <a:off x="2875855" y="2029999"/>
-          <a:ext cx="2376289" cy="3045832"/>
+          <a:off x="3292574" y="1098777"/>
+          <a:ext cx="1542851" cy="3728948"/>
         </a:xfrm>
         <a:prstGeom prst="rect">
           <a:avLst/>
@@ -1847,12 +2080,12 @@
         </a:fontRef>
       </dsp:style>
       <dsp:txBody>
-        <a:bodyPr spcFirstLastPara="0" vert="horz" wrap="square" lIns="16510" tIns="16510" rIns="16510" bIns="16510" numCol="1" spcCol="1270" anchor="ctr" anchorCtr="0">
+        <a:bodyPr spcFirstLastPara="0" vert="horz" wrap="square" lIns="10795" tIns="10795" rIns="10795" bIns="10795" numCol="1" spcCol="1270" anchor="ctr" anchorCtr="0">
           <a:noAutofit/>
         </a:bodyPr>
         <a:lstStyle/>
         <a:p>
-          <a:pPr lvl="0" algn="ctr" defTabSz="1155700">
+          <a:pPr lvl="0" algn="ctr" defTabSz="755650">
             <a:lnSpc>
               <a:spcPct val="90000"/>
             </a:lnSpc>
@@ -1864,12 +2097,12 @@
             </a:spcAft>
           </a:pPr>
           <a:r>
-            <a:rPr lang="en-US" sz="2600" kern="1200" dirty="0" smtClean="0"/>
+            <a:rPr lang="en-US" sz="1700" kern="1200" dirty="0" smtClean="0"/>
             <a:t>ACCOUNT</a:t>
           </a:r>
         </a:p>
         <a:p>
-          <a:pPr lvl="0" algn="ctr" defTabSz="1155700">
+          <a:pPr lvl="0" algn="ctr" defTabSz="755650">
             <a:lnSpc>
               <a:spcPct val="90000"/>
             </a:lnSpc>
@@ -1881,12 +2114,12 @@
             </a:spcAft>
           </a:pPr>
           <a:r>
-            <a:rPr lang="en-US" sz="2600" kern="1200" dirty="0" smtClean="0"/>
+            <a:rPr lang="en-US" sz="1700" kern="1200" dirty="0" smtClean="0"/>
             <a:t>Id</a:t>
           </a:r>
         </a:p>
         <a:p>
-          <a:pPr lvl="0" algn="ctr" defTabSz="1155700">
+          <a:pPr lvl="0" algn="ctr" defTabSz="755650">
             <a:lnSpc>
               <a:spcPct val="90000"/>
             </a:lnSpc>
@@ -1898,12 +2131,12 @@
             </a:spcAft>
           </a:pPr>
           <a:r>
-            <a:rPr lang="en-US" sz="2600" kern="1200" dirty="0" smtClean="0"/>
+            <a:rPr lang="en-US" sz="1700" kern="1200" dirty="0" smtClean="0"/>
             <a:t>Date</a:t>
           </a:r>
         </a:p>
         <a:p>
-          <a:pPr lvl="0" algn="ctr" defTabSz="1155700">
+          <a:pPr lvl="0" algn="ctr" defTabSz="755650">
             <a:lnSpc>
               <a:spcPct val="90000"/>
             </a:lnSpc>
@@ -1915,13 +2148,13 @@
             </a:spcAft>
           </a:pPr>
           <a:r>
-            <a:rPr lang="en-US" sz="2600" kern="1200" dirty="0" err="1" smtClean="0"/>
+            <a:rPr lang="en-US" sz="1700" kern="1200" dirty="0" err="1" smtClean="0"/>
             <a:t>Due_date</a:t>
           </a:r>
-          <a:endParaRPr lang="en-US" sz="2600" kern="1200" dirty="0" smtClean="0"/>
-        </a:p>
-        <a:p>
-          <a:pPr lvl="0" algn="ctr" defTabSz="1155700">
+          <a:endParaRPr lang="en-US" sz="1700" kern="1200" dirty="0" smtClean="0"/>
+        </a:p>
+        <a:p>
+          <a:pPr lvl="0" algn="ctr" defTabSz="755650">
             <a:lnSpc>
               <a:spcPct val="90000"/>
             </a:lnSpc>
@@ -1933,15 +2166,86 @@
             </a:spcAft>
           </a:pPr>
           <a:r>
-            <a:rPr lang="en-US" sz="2600" kern="1200" dirty="0" smtClean="0"/>
+            <a:rPr lang="en-US" sz="1700" kern="1200" dirty="0" smtClean="0"/>
             <a:t>Amount</a:t>
           </a:r>
-          <a:endParaRPr lang="en-US" sz="2600" kern="1200" dirty="0" smtClean="0"/>
+        </a:p>
+        <a:p>
+          <a:pPr lvl="0" algn="ctr" defTabSz="755650">
+            <a:lnSpc>
+              <a:spcPct val="90000"/>
+            </a:lnSpc>
+            <a:spcBef>
+              <a:spcPct val="0"/>
+            </a:spcBef>
+            <a:spcAft>
+              <a:spcPct val="35000"/>
+            </a:spcAft>
+          </a:pPr>
+          <a:r>
+            <a:rPr lang="en-US" sz="1700" kern="1200" dirty="0" err="1" smtClean="0"/>
+            <a:t>Updated_by</a:t>
+          </a:r>
+          <a:endParaRPr lang="en-US" sz="1700" kern="1200" dirty="0" smtClean="0"/>
+        </a:p>
+        <a:p>
+          <a:pPr lvl="0" algn="ctr" defTabSz="755650">
+            <a:lnSpc>
+              <a:spcPct val="90000"/>
+            </a:lnSpc>
+            <a:spcBef>
+              <a:spcPct val="0"/>
+            </a:spcBef>
+            <a:spcAft>
+              <a:spcPct val="35000"/>
+            </a:spcAft>
+          </a:pPr>
+          <a:r>
+            <a:rPr lang="en-US" sz="1700" kern="1200" dirty="0" err="1" smtClean="0"/>
+            <a:t>Created_by</a:t>
+          </a:r>
+          <a:endParaRPr lang="en-US" sz="1700" kern="1200" dirty="0" smtClean="0"/>
+        </a:p>
+        <a:p>
+          <a:pPr lvl="0" algn="ctr" defTabSz="755650">
+            <a:lnSpc>
+              <a:spcPct val="90000"/>
+            </a:lnSpc>
+            <a:spcBef>
+              <a:spcPct val="0"/>
+            </a:spcBef>
+            <a:spcAft>
+              <a:spcPct val="35000"/>
+            </a:spcAft>
+          </a:pPr>
+          <a:r>
+            <a:rPr lang="en-US" sz="1700" kern="1200" dirty="0" err="1" smtClean="0"/>
+            <a:t>Date_created</a:t>
+          </a:r>
+          <a:endParaRPr lang="en-US" sz="1700" kern="1200" dirty="0" smtClean="0"/>
+        </a:p>
+        <a:p>
+          <a:pPr lvl="0" algn="ctr" defTabSz="755650">
+            <a:lnSpc>
+              <a:spcPct val="90000"/>
+            </a:lnSpc>
+            <a:spcBef>
+              <a:spcPct val="0"/>
+            </a:spcBef>
+            <a:spcAft>
+              <a:spcPct val="35000"/>
+            </a:spcAft>
+          </a:pPr>
+          <a:r>
+            <a:rPr lang="en-US" sz="1700" kern="1200" dirty="0" err="1" smtClean="0"/>
+            <a:t>Date_updated</a:t>
+          </a:r>
+          <a:endParaRPr lang="en-US" sz="1700" kern="1200" dirty="0" smtClean="0"/>
         </a:p>
       </dsp:txBody>
       <dsp:txXfrm>
-        <a:off x="2875855" y="2029999"/>
-        <a:ext cx="2376289" cy="3045832"/>
+        <a:off x="3292574" y="1098777"/>
+        <a:ext cx="1542851" cy="3728948"/>
       </dsp:txXfrm>
     </dsp:sp>
     <dsp:sp modelId="{EE9B77B7-8CAF-4DD5-84D0-BF30A17822C7}">
@@ -1951,8 +2255,8 @@
       </dsp:nvSpPr>
       <dsp:spPr>
         <a:xfrm>
-          <a:off x="5751710" y="2042879"/>
-          <a:ext cx="2376289" cy="3020061"/>
+          <a:off x="5393907" y="1107140"/>
+          <a:ext cx="1542851" cy="3227167"/>
         </a:xfrm>
         <a:prstGeom prst="rect">
           <a:avLst/>
@@ -1994,12 +2298,12 @@
         </a:fontRef>
       </dsp:style>
       <dsp:txBody>
-        <a:bodyPr spcFirstLastPara="0" vert="horz" wrap="square" lIns="16510" tIns="16510" rIns="16510" bIns="16510" numCol="1" spcCol="1270" anchor="ctr" anchorCtr="0">
+        <a:bodyPr spcFirstLastPara="0" vert="horz" wrap="square" lIns="10795" tIns="10795" rIns="10795" bIns="10795" numCol="1" spcCol="1270" anchor="ctr" anchorCtr="0">
           <a:noAutofit/>
         </a:bodyPr>
         <a:lstStyle/>
         <a:p>
-          <a:pPr lvl="0" algn="ctr" defTabSz="1155700">
+          <a:pPr lvl="0" algn="ctr" defTabSz="755650">
             <a:lnSpc>
               <a:spcPct val="90000"/>
             </a:lnSpc>
@@ -2011,12 +2315,12 @@
             </a:spcAft>
           </a:pPr>
           <a:r>
-            <a:rPr lang="en-US" sz="2600" kern="1200" dirty="0" smtClean="0"/>
+            <a:rPr lang="en-US" sz="1700" kern="1200" dirty="0" smtClean="0"/>
             <a:t>TRANSACTOR</a:t>
           </a:r>
         </a:p>
         <a:p>
-          <a:pPr lvl="0" algn="ctr" defTabSz="1155700">
+          <a:pPr lvl="0" algn="ctr" defTabSz="755650">
             <a:lnSpc>
               <a:spcPct val="90000"/>
             </a:lnSpc>
@@ -2028,12 +2332,12 @@
             </a:spcAft>
           </a:pPr>
           <a:r>
-            <a:rPr lang="en-US" sz="2600" kern="1200" dirty="0" smtClean="0"/>
+            <a:rPr lang="en-US" sz="1700" kern="1200" dirty="0" smtClean="0"/>
             <a:t>Id</a:t>
           </a:r>
         </a:p>
         <a:p>
-          <a:pPr lvl="0" algn="ctr" defTabSz="1155700">
+          <a:pPr lvl="0" algn="ctr" defTabSz="755650">
             <a:lnSpc>
               <a:spcPct val="90000"/>
             </a:lnSpc>
@@ -2045,12 +2349,12 @@
             </a:spcAft>
           </a:pPr>
           <a:r>
-            <a:rPr lang="en-US" sz="2600" kern="1200" dirty="0" smtClean="0"/>
+            <a:rPr lang="en-US" sz="1700" kern="1200" dirty="0" smtClean="0"/>
             <a:t>Name</a:t>
           </a:r>
         </a:p>
         <a:p>
-          <a:pPr lvl="0" algn="ctr" defTabSz="1155700">
+          <a:pPr lvl="0" algn="ctr" defTabSz="755650">
             <a:lnSpc>
               <a:spcPct val="90000"/>
             </a:lnSpc>
@@ -2062,12 +2366,12 @@
             </a:spcAft>
           </a:pPr>
           <a:r>
-            <a:rPr lang="en-US" sz="2600" kern="1200" dirty="0" smtClean="0"/>
+            <a:rPr lang="en-US" sz="1700" kern="1200" dirty="0" smtClean="0"/>
             <a:t>Address</a:t>
           </a:r>
         </a:p>
         <a:p>
-          <a:pPr lvl="0" algn="ctr" defTabSz="1155700">
+          <a:pPr lvl="0" algn="ctr" defTabSz="755650">
             <a:lnSpc>
               <a:spcPct val="90000"/>
             </a:lnSpc>
@@ -2079,12 +2383,12 @@
             </a:spcAft>
           </a:pPr>
           <a:r>
-            <a:rPr lang="en-US" sz="2600" kern="1200" dirty="0" smtClean="0"/>
+            <a:rPr lang="en-US" sz="1700" kern="1200" dirty="0" smtClean="0"/>
             <a:t>Contact</a:t>
           </a:r>
         </a:p>
         <a:p>
-          <a:pPr lvl="0" algn="ctr" defTabSz="1155700">
+          <a:pPr lvl="0" algn="ctr" defTabSz="755650">
             <a:lnSpc>
               <a:spcPct val="90000"/>
             </a:lnSpc>
@@ -2096,14 +2400,86 @@
             </a:spcAft>
           </a:pPr>
           <a:r>
-            <a:rPr lang="en-US" sz="2600" kern="1200" dirty="0" smtClean="0"/>
+            <a:rPr lang="en-US" sz="1700" kern="1200" dirty="0" smtClean="0"/>
             <a:t>Terms</a:t>
           </a:r>
         </a:p>
+        <a:p>
+          <a:pPr lvl="0" algn="ctr" defTabSz="755650">
+            <a:lnSpc>
+              <a:spcPct val="90000"/>
+            </a:lnSpc>
+            <a:spcBef>
+              <a:spcPct val="0"/>
+            </a:spcBef>
+            <a:spcAft>
+              <a:spcPct val="35000"/>
+            </a:spcAft>
+          </a:pPr>
+          <a:r>
+            <a:rPr lang="en-US" sz="1700" kern="1200" dirty="0" err="1" smtClean="0"/>
+            <a:t>Updated_by</a:t>
+          </a:r>
+          <a:endParaRPr lang="en-US" sz="1700" kern="1200" dirty="0" smtClean="0"/>
+        </a:p>
+        <a:p>
+          <a:pPr lvl="0" algn="ctr" defTabSz="755650">
+            <a:lnSpc>
+              <a:spcPct val="90000"/>
+            </a:lnSpc>
+            <a:spcBef>
+              <a:spcPct val="0"/>
+            </a:spcBef>
+            <a:spcAft>
+              <a:spcPct val="35000"/>
+            </a:spcAft>
+          </a:pPr>
+          <a:r>
+            <a:rPr lang="en-US" sz="1700" kern="1200" dirty="0" err="1" smtClean="0"/>
+            <a:t>Created_by</a:t>
+          </a:r>
+          <a:endParaRPr lang="en-US" sz="1700" kern="1200" dirty="0" smtClean="0"/>
+        </a:p>
+        <a:p>
+          <a:pPr lvl="0" algn="ctr" defTabSz="755650">
+            <a:lnSpc>
+              <a:spcPct val="90000"/>
+            </a:lnSpc>
+            <a:spcBef>
+              <a:spcPct val="0"/>
+            </a:spcBef>
+            <a:spcAft>
+              <a:spcPct val="35000"/>
+            </a:spcAft>
+          </a:pPr>
+          <a:r>
+            <a:rPr lang="en-US" sz="1700" kern="1200" dirty="0" err="1" smtClean="0"/>
+            <a:t>Date_created</a:t>
+          </a:r>
+          <a:endParaRPr lang="en-US" sz="1700" kern="1200" dirty="0" smtClean="0"/>
+        </a:p>
+        <a:p>
+          <a:pPr lvl="0" algn="ctr" defTabSz="755650">
+            <a:lnSpc>
+              <a:spcPct val="90000"/>
+            </a:lnSpc>
+            <a:spcBef>
+              <a:spcPct val="0"/>
+            </a:spcBef>
+            <a:spcAft>
+              <a:spcPct val="35000"/>
+            </a:spcAft>
+          </a:pPr>
+          <a:r>
+            <a:rPr lang="en-US" sz="1700" kern="1200" smtClean="0"/>
+            <a:t>Date_updated</a:t>
+          </a:r>
+          <a:endParaRPr lang="en-US" sz="1700" kern="1200" dirty="0" smtClean="0"/>
+        </a:p>
       </dsp:txBody>
       <dsp:txXfrm>
-        <a:off x="5751710" y="2042879"/>
-        <a:ext cx="2376289" cy="3020061"/>
+        <a:off x="5393907" y="1107140"/>
+        <a:ext cx="1542851" cy="3227167"/>
       </dsp:txXfrm>
     </dsp:sp>
   </dsp:spTree>
@@ -4421,7 +4797,7 @@
           <a:p>
             <a:fld id="{9723A460-9D7A-4F6B-9C91-973F7B597F73}" type="datetimeFigureOut">
               <a:rPr lang="en-US" smtClean="0"/>
-              <a:t>7/22/2015</a:t>
+              <a:t>8/1/2015</a:t>
             </a:fld>
             <a:endParaRPr lang="en-US"/>
           </a:p>
@@ -4591,7 +4967,7 @@
           <a:p>
             <a:fld id="{9723A460-9D7A-4F6B-9C91-973F7B597F73}" type="datetimeFigureOut">
               <a:rPr lang="en-US" smtClean="0"/>
-              <a:t>7/22/2015</a:t>
+              <a:t>8/1/2015</a:t>
             </a:fld>
             <a:endParaRPr lang="en-US"/>
           </a:p>
@@ -4771,7 +5147,7 @@
           <a:p>
             <a:fld id="{9723A460-9D7A-4F6B-9C91-973F7B597F73}" type="datetimeFigureOut">
               <a:rPr lang="en-US" smtClean="0"/>
-              <a:t>7/22/2015</a:t>
+              <a:t>8/1/2015</a:t>
             </a:fld>
             <a:endParaRPr lang="en-US"/>
           </a:p>
@@ -4941,7 +5317,7 @@
           <a:p>
             <a:fld id="{9723A460-9D7A-4F6B-9C91-973F7B597F73}" type="datetimeFigureOut">
               <a:rPr lang="en-US" smtClean="0"/>
-              <a:t>7/22/2015</a:t>
+              <a:t>8/1/2015</a:t>
             </a:fld>
             <a:endParaRPr lang="en-US"/>
           </a:p>
@@ -5187,7 +5563,7 @@
           <a:p>
             <a:fld id="{9723A460-9D7A-4F6B-9C91-973F7B597F73}" type="datetimeFigureOut">
               <a:rPr lang="en-US" smtClean="0"/>
-              <a:t>7/22/2015</a:t>
+              <a:t>8/1/2015</a:t>
             </a:fld>
             <a:endParaRPr lang="en-US"/>
           </a:p>
@@ -5419,7 +5795,7 @@
           <a:p>
             <a:fld id="{9723A460-9D7A-4F6B-9C91-973F7B597F73}" type="datetimeFigureOut">
               <a:rPr lang="en-US" smtClean="0"/>
-              <a:t>7/22/2015</a:t>
+              <a:t>8/1/2015</a:t>
             </a:fld>
             <a:endParaRPr lang="en-US"/>
           </a:p>
@@ -5786,7 +6162,7 @@
           <a:p>
             <a:fld id="{9723A460-9D7A-4F6B-9C91-973F7B597F73}" type="datetimeFigureOut">
               <a:rPr lang="en-US" smtClean="0"/>
-              <a:t>7/22/2015</a:t>
+              <a:t>8/1/2015</a:t>
             </a:fld>
             <a:endParaRPr lang="en-US"/>
           </a:p>
@@ -5904,7 +6280,7 @@
           <a:p>
             <a:fld id="{9723A460-9D7A-4F6B-9C91-973F7B597F73}" type="datetimeFigureOut">
               <a:rPr lang="en-US" smtClean="0"/>
-              <a:t>7/22/2015</a:t>
+              <a:t>8/1/2015</a:t>
             </a:fld>
             <a:endParaRPr lang="en-US"/>
           </a:p>
@@ -5999,7 +6375,7 @@
           <a:p>
             <a:fld id="{9723A460-9D7A-4F6B-9C91-973F7B597F73}" type="datetimeFigureOut">
               <a:rPr lang="en-US" smtClean="0"/>
-              <a:t>7/22/2015</a:t>
+              <a:t>8/1/2015</a:t>
             </a:fld>
             <a:endParaRPr lang="en-US"/>
           </a:p>
@@ -6276,7 +6652,7 @@
           <a:p>
             <a:fld id="{9723A460-9D7A-4F6B-9C91-973F7B597F73}" type="datetimeFigureOut">
               <a:rPr lang="en-US" smtClean="0"/>
-              <a:t>7/22/2015</a:t>
+              <a:t>8/1/2015</a:t>
             </a:fld>
             <a:endParaRPr lang="en-US"/>
           </a:p>
@@ -6529,7 +6905,7 @@
           <a:p>
             <a:fld id="{9723A460-9D7A-4F6B-9C91-973F7B597F73}" type="datetimeFigureOut">
               <a:rPr lang="en-US" smtClean="0"/>
-              <a:t>7/22/2015</a:t>
+              <a:t>8/1/2015</a:t>
             </a:fld>
             <a:endParaRPr lang="en-US"/>
           </a:p>
@@ -6742,7 +7118,7 @@
           <a:p>
             <a:fld id="{9723A460-9D7A-4F6B-9C91-973F7B597F73}" type="datetimeFigureOut">
               <a:rPr lang="en-US" smtClean="0"/>
-              <a:t>7/22/2015</a:t>
+              <a:t>8/1/2015</a:t>
             </a:fld>
             <a:endParaRPr lang="en-US"/>
           </a:p>
@@ -7154,7 +7530,7 @@
           <p:nvPr>
             <p:extLst>
               <p:ext uri="{D42A27DB-BD31-4B8C-83A1-F6EECF244321}">
-                <p14:modId xmlns:p14="http://schemas.microsoft.com/office/powerpoint/2010/main" val="2494362857"/>
+                <p14:modId xmlns:p14="http://schemas.microsoft.com/office/powerpoint/2010/main" val="2579519911"/>
               </p:ext>
             </p:extLst>
           </p:nvPr>

</xml_diff>